<commit_message>
Re-sync with update at may 15th
</commit_message>
<xml_diff>
--- a/Tugas8_STL_Kelompok4.pptx
+++ b/Tugas8_STL_Kelompok4.pptx
@@ -6,13 +6,14 @@
   </p:sldMasterIdLst>
   <p:sldIdLst>
     <p:sldId id="256" r:id="rId2"/>
-    <p:sldId id="259" r:id="rId3"/>
-    <p:sldId id="257" r:id="rId4"/>
-    <p:sldId id="258" r:id="rId5"/>
-    <p:sldId id="260" r:id="rId6"/>
-    <p:sldId id="261" r:id="rId7"/>
-    <p:sldId id="262" r:id="rId8"/>
-    <p:sldId id="263" r:id="rId9"/>
+    <p:sldId id="264" r:id="rId3"/>
+    <p:sldId id="265" r:id="rId4"/>
+    <p:sldId id="266" r:id="rId5"/>
+    <p:sldId id="267" r:id="rId6"/>
+    <p:sldId id="268" r:id="rId7"/>
+    <p:sldId id="269" r:id="rId8"/>
+    <p:sldId id="262" r:id="rId9"/>
+    <p:sldId id="263" r:id="rId10"/>
   </p:sldIdLst>
   <p:sldSz cx="12192000" cy="6858000"/>
   <p:notesSz cx="6858000" cy="9144000"/>
@@ -3750,7 +3751,7 @@
     </p:spTree>
     <p:extLst>
       <p:ext uri="{BB962C8B-B14F-4D97-AF65-F5344CB8AC3E}">
-        <p14:creationId xmlns:p14="http://schemas.microsoft.com/office/powerpoint/2010/main" val="686754221"/>
+        <p14:creationId xmlns:p14="http://schemas.microsoft.com/office/powerpoint/2010/main" val="998287409"/>
       </p:ext>
     </p:extLst>
   </p:cSld>
@@ -4199,7 +4200,7 @@
     </p:spTree>
     <p:extLst>
       <p:ext uri="{BB962C8B-B14F-4D97-AF65-F5344CB8AC3E}">
-        <p14:creationId xmlns:p14="http://schemas.microsoft.com/office/powerpoint/2010/main" val="3254621926"/>
+        <p14:creationId xmlns:p14="http://schemas.microsoft.com/office/powerpoint/2010/main" val="2880132520"/>
       </p:ext>
     </p:extLst>
   </p:cSld>
@@ -4455,7 +4456,7 @@
     </p:spTree>
     <p:extLst>
       <p:ext uri="{BB962C8B-B14F-4D97-AF65-F5344CB8AC3E}">
-        <p14:creationId xmlns:p14="http://schemas.microsoft.com/office/powerpoint/2010/main" val="818590124"/>
+        <p14:creationId xmlns:p14="http://schemas.microsoft.com/office/powerpoint/2010/main" val="1579337632"/>
       </p:ext>
     </p:extLst>
   </p:cSld>
@@ -4505,7 +4506,7 @@
           <a:p>
             <a:r>
               <a:rPr lang="en-US" dirty="0"/>
-              <a:t>Scheduling</a:t>
+              <a:t>Task List</a:t>
             </a:r>
             <a:endParaRPr lang="en-ID" dirty="0"/>
           </a:p>
@@ -4535,7 +4536,7 @@
         </p:spPr>
         <p:txBody>
           <a:bodyPr numCol="1">
-            <a:normAutofit/>
+            <a:normAutofit lnSpcReduction="10000"/>
           </a:bodyPr>
           <a:lstStyle/>
           <a:p>
@@ -4545,7 +4546,7 @@
             </a:r>
             <a:r>
               <a:rPr lang="en-US" dirty="0" err="1"/>
-              <a:t>antarmuka</a:t>
+              <a:t>Antarmuka</a:t>
             </a:r>
             <a:r>
               <a:rPr lang="en-US" dirty="0"/>
@@ -4556,7 +4557,7 @@
               <a:t>pengguna</a:t>
             </a:r>
             <a:r>
-              <a:rPr lang="en-US"/>
+              <a:rPr lang="en-US" dirty="0"/>
               <a:t> (low, </a:t>
             </a:r>
             <a:r>
@@ -4617,6 +4618,33 @@
             </a:r>
             <a:r>
               <a:rPr lang="en-US" dirty="0"/>
+              <a:t> Input </a:t>
+            </a:r>
+            <a:r>
+              <a:rPr lang="en-US" dirty="0" err="1"/>
+              <a:t>pengguna</a:t>
+            </a:r>
+            <a:r>
+              <a:rPr lang="en-US" dirty="0"/>
+              <a:t> (medium, </a:t>
+            </a:r>
+            <a:r>
+              <a:rPr lang="en-US" dirty="0" err="1"/>
+              <a:t>periodik</a:t>
+            </a:r>
+            <a:r>
+              <a:rPr lang="en-US" dirty="0"/>
+              <a:t>)</a:t>
+            </a:r>
+          </a:p>
+          <a:p>
+            <a:pPr lvl="1"/>
+            <a:r>
+              <a:rPr lang="en-US" dirty="0" err="1"/>
+              <a:t>Membaca</a:t>
+            </a:r>
+            <a:r>
+              <a:rPr lang="en-US" dirty="0"/>
               <a:t> </a:t>
             </a:r>
             <a:r>
@@ -4629,11 +4657,110 @@
             </a:r>
             <a:r>
               <a:rPr lang="en-US" dirty="0" err="1"/>
+              <a:t>arah</a:t>
+            </a:r>
+            <a:r>
+              <a:rPr lang="en-US" dirty="0"/>
+              <a:t> (naik/</a:t>
+            </a:r>
+            <a:r>
+              <a:rPr lang="en-US" dirty="0" err="1"/>
+              <a:t>turun</a:t>
+            </a:r>
+            <a:r>
+              <a:rPr lang="en-US" dirty="0"/>
+              <a:t>) </a:t>
+            </a:r>
+            <a:r>
+              <a:rPr lang="en-US" dirty="0" err="1"/>
+              <a:t>dari</a:t>
+            </a:r>
+            <a:r>
+              <a:rPr lang="en-US" dirty="0"/>
+              <a:t> </a:t>
+            </a:r>
+            <a:r>
+              <a:rPr lang="en-US" dirty="0" err="1"/>
+              <a:t>setiap</a:t>
+            </a:r>
+            <a:r>
+              <a:rPr lang="en-US" dirty="0"/>
+              <a:t> </a:t>
+            </a:r>
+            <a:r>
+              <a:rPr lang="en-US" dirty="0" err="1"/>
+              <a:t>lantai</a:t>
+            </a:r>
+            <a:endParaRPr lang="en-US" dirty="0"/>
+          </a:p>
+          <a:p>
+            <a:pPr lvl="1"/>
+            <a:r>
+              <a:rPr lang="en-US" dirty="0" err="1"/>
+              <a:t>Membaca</a:t>
+            </a:r>
+            <a:r>
+              <a:rPr lang="en-US" dirty="0"/>
+              <a:t> </a:t>
+            </a:r>
+            <a:r>
+              <a:rPr lang="en-US" dirty="0" err="1"/>
+              <a:t>masukan</a:t>
+            </a:r>
+            <a:r>
+              <a:rPr lang="en-US" dirty="0"/>
+              <a:t> </a:t>
+            </a:r>
+            <a:r>
+              <a:rPr lang="en-US" dirty="0" err="1"/>
+              <a:t>tujuan</a:t>
+            </a:r>
+            <a:r>
+              <a:rPr lang="en-US" dirty="0"/>
+              <a:t> </a:t>
+            </a:r>
+            <a:r>
+              <a:rPr lang="en-US" dirty="0" err="1"/>
+              <a:t>lantai</a:t>
+            </a:r>
+            <a:r>
+              <a:rPr lang="en-US" dirty="0"/>
+              <a:t> dan </a:t>
+            </a:r>
+            <a:r>
+              <a:rPr lang="en-US" dirty="0" err="1"/>
+              <a:t>berat</a:t>
+            </a:r>
+            <a:r>
+              <a:rPr lang="en-US" dirty="0"/>
+              <a:t> </a:t>
+            </a:r>
+            <a:r>
+              <a:rPr lang="en-US" dirty="0" err="1"/>
+              <a:t>barang</a:t>
+            </a:r>
+            <a:r>
+              <a:rPr lang="en-US" dirty="0"/>
+              <a:t> </a:t>
+            </a:r>
+            <a:r>
+              <a:rPr lang="en-US" dirty="0" err="1"/>
+              <a:t>dari</a:t>
+            </a:r>
+            <a:r>
+              <a:rPr lang="en-US" dirty="0"/>
+              <a:t> </a:t>
+            </a:r>
+            <a:r>
+              <a:rPr lang="en-US" dirty="0" err="1"/>
               <a:t>pengguna</a:t>
             </a:r>
-            <a:r>
-              <a:rPr lang="en-US" dirty="0"/>
-              <a:t> (medium, </a:t>
+            <a:endParaRPr lang="en-US" dirty="0"/>
+          </a:p>
+          <a:p>
+            <a:r>
+              <a:rPr lang="en-US" dirty="0"/>
+              <a:t>Task Ultrasonik (high, </a:t>
             </a:r>
             <a:r>
               <a:rPr lang="en-US" dirty="0" err="1"/>
@@ -4652,35 +4779,160 @@
             </a:r>
             <a:r>
               <a:rPr lang="en-US" dirty="0"/>
+              <a:t> status sensor ultrasonik</a:t>
+            </a:r>
+          </a:p>
+          <a:p>
+            <a:r>
+              <a:rPr lang="en-US" dirty="0"/>
+              <a:t>Task Load Cell (high, </a:t>
+            </a:r>
+            <a:r>
+              <a:rPr lang="en-US" dirty="0" err="1"/>
+              <a:t>periodik</a:t>
+            </a:r>
+            <a:r>
+              <a:rPr lang="en-US" dirty="0"/>
+              <a:t>)</a:t>
+            </a:r>
+          </a:p>
+          <a:p>
+            <a:pPr lvl="1"/>
+            <a:r>
+              <a:rPr lang="en-US" dirty="0" err="1"/>
+              <a:t>Membaca</a:t>
+            </a:r>
+            <a:r>
+              <a:rPr lang="en-US" dirty="0"/>
               <a:t> </a:t>
             </a:r>
             <a:r>
               <a:rPr lang="en-US" dirty="0" err="1"/>
+              <a:t>berat</a:t>
+            </a:r>
+            <a:r>
+              <a:rPr lang="en-US" dirty="0"/>
+              <a:t> </a:t>
+            </a:r>
+            <a:r>
+              <a:rPr lang="en-US" dirty="0" err="1"/>
+              <a:t>barang</a:t>
+            </a:r>
+            <a:endParaRPr lang="en-US" dirty="0"/>
+          </a:p>
+          <a:p>
+            <a:r>
+              <a:rPr lang="en-US" dirty="0"/>
+              <a:t>Task Sensor </a:t>
+            </a:r>
+            <a:r>
+              <a:rPr lang="en-US" dirty="0" err="1"/>
+              <a:t>Gempa</a:t>
+            </a:r>
+            <a:r>
+              <a:rPr lang="en-US" dirty="0"/>
+              <a:t> (high, </a:t>
+            </a:r>
+            <a:r>
+              <a:rPr lang="en-US" dirty="0" err="1"/>
+              <a:t>periodik</a:t>
+            </a:r>
+            <a:r>
+              <a:rPr lang="en-US" dirty="0"/>
+              <a:t>)</a:t>
+            </a:r>
+          </a:p>
+          <a:p>
+            <a:pPr lvl="1"/>
+            <a:r>
+              <a:rPr lang="en-US" dirty="0" err="1"/>
+              <a:t>Membaca</a:t>
+            </a:r>
+            <a:r>
+              <a:rPr lang="en-US" dirty="0"/>
+              <a:t> </a:t>
+            </a:r>
+            <a:r>
+              <a:rPr lang="en-US" dirty="0" err="1"/>
+              <a:t>kondisi</a:t>
+            </a:r>
+            <a:r>
+              <a:rPr lang="en-US" dirty="0"/>
+              <a:t> potentiometer </a:t>
+            </a:r>
+            <a:r>
+              <a:rPr lang="en-US" dirty="0" err="1"/>
+              <a:t>sebagai</a:t>
+            </a:r>
+            <a:r>
+              <a:rPr lang="en-US" dirty="0"/>
+              <a:t> </a:t>
+            </a:r>
+            <a:r>
+              <a:rPr lang="en-US" dirty="0" err="1"/>
+              <a:t>simulasi</a:t>
+            </a:r>
+            <a:r>
+              <a:rPr lang="en-US" dirty="0"/>
+              <a:t> </a:t>
+            </a:r>
+            <a:r>
+              <a:rPr lang="en-US" dirty="0" err="1"/>
+              <a:t>gempa</a:t>
+            </a:r>
+            <a:endParaRPr lang="en-US" dirty="0"/>
+          </a:p>
+          <a:p>
+            <a:r>
+              <a:rPr lang="en-US" dirty="0"/>
+              <a:t>Task </a:t>
+            </a:r>
+            <a:r>
+              <a:rPr lang="en-US" dirty="0" err="1"/>
+              <a:t>membaca</a:t>
+            </a:r>
+            <a:r>
+              <a:rPr lang="en-US" dirty="0"/>
+              <a:t> emergency (high, event)</a:t>
+            </a:r>
+          </a:p>
+          <a:p>
+            <a:pPr lvl="1"/>
+            <a:r>
+              <a:rPr lang="en-US" dirty="0" err="1"/>
+              <a:t>Membaca</a:t>
+            </a:r>
+            <a:r>
+              <a:rPr lang="en-US" dirty="0"/>
+              <a:t> </a:t>
+            </a:r>
+            <a:r>
+              <a:rPr lang="en-US" dirty="0" err="1"/>
               <a:t>masukan</a:t>
             </a:r>
             <a:r>
               <a:rPr lang="en-US" dirty="0"/>
+              <a:t> emergency </a:t>
+            </a:r>
+            <a:r>
+              <a:rPr lang="en-US" dirty="0" err="1"/>
+              <a:t>dari</a:t>
+            </a:r>
+            <a:r>
+              <a:rPr lang="en-US" dirty="0"/>
               <a:t> </a:t>
             </a:r>
             <a:r>
               <a:rPr lang="en-US" dirty="0" err="1"/>
-              <a:t>arah</a:t>
-            </a:r>
-            <a:r>
-              <a:rPr lang="en-US" dirty="0"/>
-              <a:t> (naik/</a:t>
-            </a:r>
-            <a:r>
-              <a:rPr lang="en-US" dirty="0" err="1"/>
-              <a:t>turun</a:t>
-            </a:r>
-            <a:r>
-              <a:rPr lang="en-US" dirty="0"/>
-              <a:t>) </a:t>
-            </a:r>
-            <a:r>
-              <a:rPr lang="en-US" dirty="0" err="1"/>
-              <a:t>dari</a:t>
+              <a:t>pengguna</a:t>
+            </a:r>
+            <a:endParaRPr lang="en-US" dirty="0"/>
+          </a:p>
+          <a:p>
+            <a:pPr lvl="1"/>
+            <a:r>
+              <a:rPr lang="en-US" dirty="0" err="1"/>
+              <a:t>Menentukan</a:t>
             </a:r>
             <a:r>
               <a:rPr lang="en-US" dirty="0"/>
@@ -4688,226 +4940,19 @@
             </a:r>
             <a:r>
               <a:rPr lang="en-US" dirty="0" err="1"/>
-              <a:t>setiap</a:t>
-            </a:r>
-            <a:r>
-              <a:rPr lang="en-US" dirty="0"/>
-              <a:t> </a:t>
-            </a:r>
-            <a:r>
-              <a:rPr lang="en-US" dirty="0" err="1"/>
-              <a:t>lantai</a:t>
-            </a:r>
-            <a:endParaRPr lang="en-US" dirty="0"/>
-          </a:p>
-          <a:p>
-            <a:pPr lvl="1"/>
-            <a:r>
-              <a:rPr lang="en-US" dirty="0" err="1"/>
-              <a:t>Membaca</a:t>
-            </a:r>
-            <a:r>
-              <a:rPr lang="en-US" dirty="0"/>
-              <a:t> </a:t>
-            </a:r>
-            <a:r>
-              <a:rPr lang="en-US" dirty="0" err="1"/>
-              <a:t>masukan</a:t>
-            </a:r>
-            <a:r>
-              <a:rPr lang="en-US" dirty="0"/>
-              <a:t> </a:t>
-            </a:r>
-            <a:r>
-              <a:rPr lang="en-US" dirty="0" err="1"/>
-              <a:t>tujuan</a:t>
-            </a:r>
-            <a:r>
-              <a:rPr lang="en-US" dirty="0"/>
-              <a:t> </a:t>
-            </a:r>
-            <a:r>
-              <a:rPr lang="en-US" dirty="0" err="1"/>
-              <a:t>lantai</a:t>
-            </a:r>
-            <a:r>
-              <a:rPr lang="en-US" dirty="0"/>
-              <a:t> dan </a:t>
-            </a:r>
-            <a:r>
-              <a:rPr lang="en-US" dirty="0" err="1"/>
-              <a:t>berat</a:t>
-            </a:r>
-            <a:r>
-              <a:rPr lang="en-US" dirty="0"/>
-              <a:t> </a:t>
-            </a:r>
-            <a:r>
-              <a:rPr lang="en-US" dirty="0" err="1"/>
-              <a:t>barang</a:t>
-            </a:r>
-            <a:r>
-              <a:rPr lang="en-US" dirty="0"/>
-              <a:t> </a:t>
-            </a:r>
-            <a:r>
-              <a:rPr lang="en-US" dirty="0" err="1"/>
-              <a:t>dari</a:t>
-            </a:r>
-            <a:r>
-              <a:rPr lang="en-US" dirty="0"/>
-              <a:t> </a:t>
-            </a:r>
-            <a:r>
-              <a:rPr lang="en-US" dirty="0" err="1"/>
-              <a:t>pengguna</a:t>
-            </a:r>
-            <a:endParaRPr lang="en-US" dirty="0"/>
-          </a:p>
-          <a:p>
-            <a:r>
-              <a:rPr lang="en-US" dirty="0"/>
-              <a:t>Task </a:t>
-            </a:r>
-            <a:r>
-              <a:rPr lang="en-US" dirty="0" err="1"/>
-              <a:t>membaca</a:t>
-            </a:r>
-            <a:r>
-              <a:rPr lang="en-US" dirty="0"/>
-              <a:t> emergency (high, event)</a:t>
-            </a:r>
-          </a:p>
-          <a:p>
-            <a:pPr lvl="1"/>
-            <a:r>
-              <a:rPr lang="en-US" dirty="0" err="1"/>
-              <a:t>Membaca</a:t>
-            </a:r>
-            <a:r>
-              <a:rPr lang="en-US" dirty="0"/>
-              <a:t> </a:t>
-            </a:r>
-            <a:r>
-              <a:rPr lang="en-US" dirty="0" err="1"/>
-              <a:t>masukan</a:t>
-            </a:r>
-            <a:r>
-              <a:rPr lang="en-US" dirty="0"/>
-              <a:t> emergency </a:t>
-            </a:r>
-            <a:r>
-              <a:rPr lang="en-US" dirty="0" err="1"/>
-              <a:t>dari</a:t>
-            </a:r>
-            <a:r>
-              <a:rPr lang="en-US" dirty="0"/>
-              <a:t> </a:t>
-            </a:r>
-            <a:r>
-              <a:rPr lang="en-US" dirty="0" err="1"/>
-              <a:t>pengguna</a:t>
-            </a:r>
-            <a:endParaRPr lang="en-US" dirty="0"/>
-          </a:p>
-          <a:p>
-            <a:pPr lvl="1"/>
-            <a:r>
-              <a:rPr lang="en-US" dirty="0" err="1"/>
-              <a:t>Membaca</a:t>
-            </a:r>
-            <a:r>
-              <a:rPr lang="en-US" dirty="0"/>
-              <a:t> </a:t>
-            </a:r>
-            <a:r>
-              <a:rPr lang="en-US" dirty="0" err="1"/>
               <a:t>kondisi</a:t>
             </a:r>
             <a:r>
               <a:rPr lang="en-US" dirty="0"/>
-              <a:t> potentiometer </a:t>
-            </a:r>
-            <a:r>
-              <a:rPr lang="en-US" dirty="0" err="1"/>
-              <a:t>sebagai</a:t>
-            </a:r>
-            <a:r>
-              <a:rPr lang="en-US" dirty="0"/>
-              <a:t> </a:t>
-            </a:r>
-            <a:r>
-              <a:rPr lang="en-US" dirty="0" err="1"/>
-              <a:t>simulasi</a:t>
-            </a:r>
-            <a:r>
-              <a:rPr lang="en-US" dirty="0"/>
-              <a:t> </a:t>
-            </a:r>
-            <a:r>
-              <a:rPr lang="en-US" dirty="0" err="1"/>
-              <a:t>gempa</a:t>
-            </a:r>
-            <a:endParaRPr lang="en-US" dirty="0"/>
-          </a:p>
-          <a:p>
-            <a:pPr lvl="1"/>
-            <a:r>
-              <a:rPr lang="en-US" dirty="0" err="1"/>
-              <a:t>Membaca</a:t>
-            </a:r>
-            <a:r>
-              <a:rPr lang="en-US" dirty="0"/>
-              <a:t> </a:t>
-            </a:r>
-            <a:r>
-              <a:rPr lang="en-US" dirty="0" err="1"/>
-              <a:t>berat</a:t>
-            </a:r>
-            <a:r>
-              <a:rPr lang="en-US" dirty="0"/>
-              <a:t> total</a:t>
-            </a:r>
-          </a:p>
-          <a:p>
-            <a:pPr lvl="1"/>
-            <a:r>
-              <a:rPr lang="en-US" dirty="0" err="1"/>
-              <a:t>Membaca</a:t>
-            </a:r>
-            <a:r>
-              <a:rPr lang="en-US" dirty="0"/>
-              <a:t> status sensor ultrasonik</a:t>
-            </a:r>
-          </a:p>
-          <a:p>
-            <a:pPr lvl="1"/>
-            <a:r>
-              <a:rPr lang="en-US" dirty="0" err="1"/>
-              <a:t>Menentukan</a:t>
-            </a:r>
-            <a:r>
-              <a:rPr lang="en-US" dirty="0"/>
-              <a:t> </a:t>
-            </a:r>
-            <a:r>
-              <a:rPr lang="en-US" dirty="0" err="1"/>
-              <a:t>kondisi</a:t>
-            </a:r>
-            <a:r>
-              <a:rPr lang="en-US" dirty="0"/>
               <a:t> emergency</a:t>
             </a:r>
-          </a:p>
-          <a:p>
-            <a:endParaRPr lang="en-ID" dirty="0"/>
           </a:p>
         </p:txBody>
       </p:sp>
     </p:spTree>
     <p:extLst>
       <p:ext uri="{BB962C8B-B14F-4D97-AF65-F5344CB8AC3E}">
-        <p14:creationId xmlns:p14="http://schemas.microsoft.com/office/powerpoint/2010/main" val="4072675818"/>
+        <p14:creationId xmlns:p14="http://schemas.microsoft.com/office/powerpoint/2010/main" val="3255388054"/>
       </p:ext>
     </p:extLst>
   </p:cSld>
@@ -4939,6 +4984,3730 @@
           <p:cNvPr id="2" name="Title 1">
             <a:extLst>
               <a:ext uri="{FF2B5EF4-FFF2-40B4-BE49-F238E27FC236}">
+                <a16:creationId xmlns:a16="http://schemas.microsoft.com/office/drawing/2014/main" id="{DA2C4D5E-AC24-890D-9F9D-ABD71FA38250}"/>
+              </a:ext>
+            </a:extLst>
+          </p:cNvPr>
+          <p:cNvSpPr>
+            <a:spLocks noGrp="1"/>
+          </p:cNvSpPr>
+          <p:nvPr>
+            <p:ph type="title"/>
+          </p:nvPr>
+        </p:nvSpPr>
+        <p:spPr/>
+        <p:txBody>
+          <a:bodyPr/>
+          <a:lstStyle/>
+          <a:p>
+            <a:r>
+              <a:rPr lang="en-US" dirty="0"/>
+              <a:t>Schedule Timeline</a:t>
+            </a:r>
+            <a:endParaRPr lang="en-ID" dirty="0"/>
+          </a:p>
+        </p:txBody>
+      </p:sp>
+      <p:sp>
+        <p:nvSpPr>
+          <p:cNvPr id="7" name="Rectangle 6">
+            <a:extLst>
+              <a:ext uri="{FF2B5EF4-FFF2-40B4-BE49-F238E27FC236}">
+                <a16:creationId xmlns:a16="http://schemas.microsoft.com/office/drawing/2014/main" id="{DD96C8C6-005F-B9C2-1724-02342F004311}"/>
+              </a:ext>
+            </a:extLst>
+          </p:cNvPr>
+          <p:cNvSpPr/>
+          <p:nvPr/>
+        </p:nvSpPr>
+        <p:spPr>
+          <a:xfrm>
+            <a:off x="3474159" y="866947"/>
+            <a:ext cx="1459247" cy="666733"/>
+          </a:xfrm>
+          <a:prstGeom prst="rect">
+            <a:avLst/>
+          </a:prstGeom>
+          <a:solidFill>
+            <a:schemeClr val="accent4">
+              <a:lumMod val="75000"/>
+            </a:schemeClr>
+          </a:solidFill>
+        </p:spPr>
+        <p:style>
+          <a:lnRef idx="2">
+            <a:schemeClr val="accent1">
+              <a:shade val="50000"/>
+            </a:schemeClr>
+          </a:lnRef>
+          <a:fillRef idx="1">
+            <a:schemeClr val="accent1"/>
+          </a:fillRef>
+          <a:effectRef idx="0">
+            <a:schemeClr val="accent1"/>
+          </a:effectRef>
+          <a:fontRef idx="minor">
+            <a:schemeClr val="lt1"/>
+          </a:fontRef>
+        </p:style>
+        <p:txBody>
+          <a:bodyPr rtlCol="0" anchor="ctr"/>
+          <a:lstStyle/>
+          <a:p>
+            <a:pPr algn="ctr"/>
+            <a:r>
+              <a:rPr lang="en-US" sz="2000" dirty="0">
+                <a:latin typeface="Times New Roman" panose="02020603050405020304" pitchFamily="18" charset="0"/>
+                <a:cs typeface="Times New Roman" panose="02020603050405020304" pitchFamily="18" charset="0"/>
+              </a:rPr>
+              <a:t>Task</a:t>
+            </a:r>
+          </a:p>
+          <a:p>
+            <a:pPr algn="ctr"/>
+            <a:r>
+              <a:rPr lang="en-US" sz="2000" dirty="0" err="1">
+                <a:latin typeface="Times New Roman" panose="02020603050405020304" pitchFamily="18" charset="0"/>
+                <a:cs typeface="Times New Roman" panose="02020603050405020304" pitchFamily="18" charset="0"/>
+              </a:rPr>
+              <a:t>Antarmuka</a:t>
+            </a:r>
+            <a:endParaRPr lang="en-US" sz="2000" dirty="0">
+              <a:latin typeface="Times New Roman" panose="02020603050405020304" pitchFamily="18" charset="0"/>
+              <a:cs typeface="Times New Roman" panose="02020603050405020304" pitchFamily="18" charset="0"/>
+            </a:endParaRPr>
+          </a:p>
+        </p:txBody>
+      </p:sp>
+      <p:sp>
+        <p:nvSpPr>
+          <p:cNvPr id="8" name="Rectangle 7">
+            <a:extLst>
+              <a:ext uri="{FF2B5EF4-FFF2-40B4-BE49-F238E27FC236}">
+                <a16:creationId xmlns:a16="http://schemas.microsoft.com/office/drawing/2014/main" id="{FF98CC4B-AA9A-2937-8376-B2AD5A31F2A9}"/>
+              </a:ext>
+            </a:extLst>
+          </p:cNvPr>
+          <p:cNvSpPr/>
+          <p:nvPr/>
+        </p:nvSpPr>
+        <p:spPr>
+          <a:xfrm>
+            <a:off x="3474159" y="1615383"/>
+            <a:ext cx="1459247" cy="666733"/>
+          </a:xfrm>
+          <a:prstGeom prst="rect">
+            <a:avLst/>
+          </a:prstGeom>
+          <a:solidFill>
+            <a:schemeClr val="accent6">
+              <a:lumMod val="60000"/>
+              <a:lumOff val="40000"/>
+            </a:schemeClr>
+          </a:solidFill>
+        </p:spPr>
+        <p:style>
+          <a:lnRef idx="2">
+            <a:schemeClr val="accent1">
+              <a:shade val="50000"/>
+            </a:schemeClr>
+          </a:lnRef>
+          <a:fillRef idx="1">
+            <a:schemeClr val="accent1"/>
+          </a:fillRef>
+          <a:effectRef idx="0">
+            <a:schemeClr val="accent1"/>
+          </a:effectRef>
+          <a:fontRef idx="minor">
+            <a:schemeClr val="lt1"/>
+          </a:fontRef>
+        </p:style>
+        <p:txBody>
+          <a:bodyPr rtlCol="0" anchor="ctr"/>
+          <a:lstStyle/>
+          <a:p>
+            <a:pPr algn="ctr"/>
+            <a:r>
+              <a:rPr lang="en-US" sz="2000" dirty="0">
+                <a:latin typeface="Times New Roman" panose="02020603050405020304" pitchFamily="18" charset="0"/>
+                <a:cs typeface="Times New Roman" panose="02020603050405020304" pitchFamily="18" charset="0"/>
+              </a:rPr>
+              <a:t>Task</a:t>
+            </a:r>
+          </a:p>
+          <a:p>
+            <a:pPr algn="ctr"/>
+            <a:r>
+              <a:rPr lang="en-US" sz="2000" dirty="0">
+                <a:latin typeface="Times New Roman" panose="02020603050405020304" pitchFamily="18" charset="0"/>
+                <a:cs typeface="Times New Roman" panose="02020603050405020304" pitchFamily="18" charset="0"/>
+              </a:rPr>
+              <a:t>Input</a:t>
+            </a:r>
+          </a:p>
+        </p:txBody>
+      </p:sp>
+      <p:sp>
+        <p:nvSpPr>
+          <p:cNvPr id="9" name="Rectangle 8">
+            <a:extLst>
+              <a:ext uri="{FF2B5EF4-FFF2-40B4-BE49-F238E27FC236}">
+                <a16:creationId xmlns:a16="http://schemas.microsoft.com/office/drawing/2014/main" id="{67EAD1B1-01AA-97CF-AC12-9AAB94970E68}"/>
+              </a:ext>
+            </a:extLst>
+          </p:cNvPr>
+          <p:cNvSpPr/>
+          <p:nvPr/>
+        </p:nvSpPr>
+        <p:spPr>
+          <a:xfrm>
+            <a:off x="3474159" y="2363819"/>
+            <a:ext cx="1459247" cy="666733"/>
+          </a:xfrm>
+          <a:prstGeom prst="rect">
+            <a:avLst/>
+          </a:prstGeom>
+          <a:solidFill>
+            <a:srgbClr val="00B050"/>
+          </a:solidFill>
+        </p:spPr>
+        <p:style>
+          <a:lnRef idx="2">
+            <a:schemeClr val="accent1">
+              <a:shade val="50000"/>
+            </a:schemeClr>
+          </a:lnRef>
+          <a:fillRef idx="1">
+            <a:schemeClr val="accent1"/>
+          </a:fillRef>
+          <a:effectRef idx="0">
+            <a:schemeClr val="accent1"/>
+          </a:effectRef>
+          <a:fontRef idx="minor">
+            <a:schemeClr val="lt1"/>
+          </a:fontRef>
+        </p:style>
+        <p:txBody>
+          <a:bodyPr rtlCol="0" anchor="ctr"/>
+          <a:lstStyle/>
+          <a:p>
+            <a:pPr algn="ctr"/>
+            <a:r>
+              <a:rPr lang="en-US" sz="2000" dirty="0">
+                <a:solidFill>
+                  <a:schemeClr val="bg1"/>
+                </a:solidFill>
+                <a:latin typeface="Times New Roman" panose="02020603050405020304" pitchFamily="18" charset="0"/>
+                <a:cs typeface="Times New Roman" panose="02020603050405020304" pitchFamily="18" charset="0"/>
+              </a:rPr>
+              <a:t>Task </a:t>
+            </a:r>
+          </a:p>
+          <a:p>
+            <a:pPr algn="ctr"/>
+            <a:r>
+              <a:rPr lang="en-US" sz="2000" dirty="0">
+                <a:solidFill>
+                  <a:schemeClr val="bg1"/>
+                </a:solidFill>
+                <a:latin typeface="Times New Roman" panose="02020603050405020304" pitchFamily="18" charset="0"/>
+                <a:cs typeface="Times New Roman" panose="02020603050405020304" pitchFamily="18" charset="0"/>
+              </a:rPr>
+              <a:t>Ultrasonik</a:t>
+            </a:r>
+          </a:p>
+        </p:txBody>
+      </p:sp>
+      <p:sp>
+        <p:nvSpPr>
+          <p:cNvPr id="10" name="Rectangle 9">
+            <a:extLst>
+              <a:ext uri="{FF2B5EF4-FFF2-40B4-BE49-F238E27FC236}">
+                <a16:creationId xmlns:a16="http://schemas.microsoft.com/office/drawing/2014/main" id="{1EAD3739-2B89-C4F8-ED94-A80116930A4C}"/>
+              </a:ext>
+            </a:extLst>
+          </p:cNvPr>
+          <p:cNvSpPr/>
+          <p:nvPr/>
+        </p:nvSpPr>
+        <p:spPr>
+          <a:xfrm>
+            <a:off x="3474159" y="3112255"/>
+            <a:ext cx="1459247" cy="666733"/>
+          </a:xfrm>
+          <a:prstGeom prst="rect">
+            <a:avLst/>
+          </a:prstGeom>
+          <a:solidFill>
+            <a:srgbClr val="FFC000"/>
+          </a:solidFill>
+        </p:spPr>
+        <p:style>
+          <a:lnRef idx="2">
+            <a:schemeClr val="accent1">
+              <a:shade val="50000"/>
+            </a:schemeClr>
+          </a:lnRef>
+          <a:fillRef idx="1">
+            <a:schemeClr val="accent1"/>
+          </a:fillRef>
+          <a:effectRef idx="0">
+            <a:schemeClr val="accent1"/>
+          </a:effectRef>
+          <a:fontRef idx="minor">
+            <a:schemeClr val="lt1"/>
+          </a:fontRef>
+        </p:style>
+        <p:txBody>
+          <a:bodyPr rtlCol="0" anchor="ctr"/>
+          <a:lstStyle/>
+          <a:p>
+            <a:pPr algn="ctr"/>
+            <a:r>
+              <a:rPr lang="en-US" sz="2000" dirty="0">
+                <a:solidFill>
+                  <a:schemeClr val="bg1"/>
+                </a:solidFill>
+                <a:latin typeface="Times New Roman" panose="02020603050405020304" pitchFamily="18" charset="0"/>
+                <a:cs typeface="Times New Roman" panose="02020603050405020304" pitchFamily="18" charset="0"/>
+              </a:rPr>
+              <a:t>Task </a:t>
+            </a:r>
+          </a:p>
+          <a:p>
+            <a:pPr algn="ctr"/>
+            <a:r>
+              <a:rPr lang="en-US" sz="2000" dirty="0">
+                <a:solidFill>
+                  <a:schemeClr val="bg1"/>
+                </a:solidFill>
+                <a:latin typeface="Times New Roman" panose="02020603050405020304" pitchFamily="18" charset="0"/>
+                <a:cs typeface="Times New Roman" panose="02020603050405020304" pitchFamily="18" charset="0"/>
+              </a:rPr>
+              <a:t>Load Cell</a:t>
+            </a:r>
+          </a:p>
+        </p:txBody>
+      </p:sp>
+      <p:sp>
+        <p:nvSpPr>
+          <p:cNvPr id="11" name="Rectangle 10">
+            <a:extLst>
+              <a:ext uri="{FF2B5EF4-FFF2-40B4-BE49-F238E27FC236}">
+                <a16:creationId xmlns:a16="http://schemas.microsoft.com/office/drawing/2014/main" id="{A27FFB32-786F-7506-3254-0C7AC4E637B7}"/>
+              </a:ext>
+            </a:extLst>
+          </p:cNvPr>
+          <p:cNvSpPr/>
+          <p:nvPr/>
+        </p:nvSpPr>
+        <p:spPr>
+          <a:xfrm>
+            <a:off x="3474159" y="3860690"/>
+            <a:ext cx="1459247" cy="666733"/>
+          </a:xfrm>
+          <a:prstGeom prst="rect">
+            <a:avLst/>
+          </a:prstGeom>
+          <a:solidFill>
+            <a:schemeClr val="accent1"/>
+          </a:solidFill>
+        </p:spPr>
+        <p:style>
+          <a:lnRef idx="2">
+            <a:schemeClr val="accent1">
+              <a:shade val="50000"/>
+            </a:schemeClr>
+          </a:lnRef>
+          <a:fillRef idx="1">
+            <a:schemeClr val="accent1"/>
+          </a:fillRef>
+          <a:effectRef idx="0">
+            <a:schemeClr val="accent1"/>
+          </a:effectRef>
+          <a:fontRef idx="minor">
+            <a:schemeClr val="lt1"/>
+          </a:fontRef>
+        </p:style>
+        <p:txBody>
+          <a:bodyPr rtlCol="0" anchor="ctr"/>
+          <a:lstStyle/>
+          <a:p>
+            <a:pPr algn="ctr"/>
+            <a:r>
+              <a:rPr lang="en-US" sz="2000" dirty="0">
+                <a:latin typeface="Times New Roman" panose="02020603050405020304" pitchFamily="18" charset="0"/>
+                <a:cs typeface="Times New Roman" panose="02020603050405020304" pitchFamily="18" charset="0"/>
+              </a:rPr>
+              <a:t>Task</a:t>
+            </a:r>
+          </a:p>
+          <a:p>
+            <a:pPr algn="ctr"/>
+            <a:r>
+              <a:rPr lang="en-US" sz="2000" dirty="0" err="1">
+                <a:latin typeface="Times New Roman" panose="02020603050405020304" pitchFamily="18" charset="0"/>
+                <a:cs typeface="Times New Roman" panose="02020603050405020304" pitchFamily="18" charset="0"/>
+              </a:rPr>
+              <a:t>Gempa</a:t>
+            </a:r>
+            <a:endParaRPr lang="en-US" sz="2000" dirty="0">
+              <a:latin typeface="Times New Roman" panose="02020603050405020304" pitchFamily="18" charset="0"/>
+              <a:cs typeface="Times New Roman" panose="02020603050405020304" pitchFamily="18" charset="0"/>
+            </a:endParaRPr>
+          </a:p>
+        </p:txBody>
+      </p:sp>
+      <p:sp>
+        <p:nvSpPr>
+          <p:cNvPr id="12" name="TextBox 11">
+            <a:extLst>
+              <a:ext uri="{FF2B5EF4-FFF2-40B4-BE49-F238E27FC236}">
+                <a16:creationId xmlns:a16="http://schemas.microsoft.com/office/drawing/2014/main" id="{F87A7C0D-7FD8-AFA2-AB4C-A50922ED8215}"/>
+              </a:ext>
+            </a:extLst>
+          </p:cNvPr>
+          <p:cNvSpPr txBox="1"/>
+          <p:nvPr/>
+        </p:nvSpPr>
+        <p:spPr>
+          <a:xfrm>
+            <a:off x="4967788" y="5537809"/>
+            <a:ext cx="293670" cy="523220"/>
+          </a:xfrm>
+          <a:prstGeom prst="rect">
+            <a:avLst/>
+          </a:prstGeom>
+          <a:noFill/>
+        </p:spPr>
+        <p:txBody>
+          <a:bodyPr wrap="none" rtlCol="0">
+            <a:spAutoFit/>
+          </a:bodyPr>
+          <a:lstStyle/>
+          <a:p>
+            <a:pPr algn="ctr"/>
+            <a:r>
+              <a:rPr lang="en-US" sz="1400" dirty="0">
+                <a:latin typeface="Times New Roman" panose="02020603050405020304" pitchFamily="18" charset="0"/>
+                <a:cs typeface="Times New Roman" panose="02020603050405020304" pitchFamily="18" charset="0"/>
+              </a:rPr>
+              <a:t>T</a:t>
+            </a:r>
+          </a:p>
+          <a:p>
+            <a:pPr algn="ctr"/>
+            <a:r>
+              <a:rPr lang="en-US" sz="1400" dirty="0">
+                <a:latin typeface="Times New Roman" panose="02020603050405020304" pitchFamily="18" charset="0"/>
+                <a:cs typeface="Times New Roman" panose="02020603050405020304" pitchFamily="18" charset="0"/>
+              </a:rPr>
+              <a:t>1</a:t>
+            </a:r>
+          </a:p>
+        </p:txBody>
+      </p:sp>
+      <p:cxnSp>
+        <p:nvCxnSpPr>
+          <p:cNvPr id="13" name="Straight Connector 12">
+            <a:extLst>
+              <a:ext uri="{FF2B5EF4-FFF2-40B4-BE49-F238E27FC236}">
+                <a16:creationId xmlns:a16="http://schemas.microsoft.com/office/drawing/2014/main" id="{B6E18315-9FC0-7DFA-EFCD-8A77E58677BC}"/>
+              </a:ext>
+            </a:extLst>
+          </p:cNvPr>
+          <p:cNvCxnSpPr>
+            <a:cxnSpLocks/>
+          </p:cNvCxnSpPr>
+          <p:nvPr/>
+        </p:nvCxnSpPr>
+        <p:spPr>
+          <a:xfrm>
+            <a:off x="3482225" y="5370873"/>
+            <a:ext cx="8584269" cy="0"/>
+          </a:xfrm>
+          <a:prstGeom prst="line">
+            <a:avLst/>
+          </a:prstGeom>
+          <a:ln w="38100">
+            <a:solidFill>
+              <a:schemeClr val="tx1"/>
+            </a:solidFill>
+          </a:ln>
+        </p:spPr>
+        <p:style>
+          <a:lnRef idx="1">
+            <a:schemeClr val="accent1"/>
+          </a:lnRef>
+          <a:fillRef idx="0">
+            <a:schemeClr val="accent1"/>
+          </a:fillRef>
+          <a:effectRef idx="0">
+            <a:schemeClr val="accent1"/>
+          </a:effectRef>
+          <a:fontRef idx="minor">
+            <a:schemeClr val="tx1"/>
+          </a:fontRef>
+        </p:style>
+      </p:cxnSp>
+      <p:cxnSp>
+        <p:nvCxnSpPr>
+          <p:cNvPr id="15" name="Straight Connector 14">
+            <a:extLst>
+              <a:ext uri="{FF2B5EF4-FFF2-40B4-BE49-F238E27FC236}">
+                <a16:creationId xmlns:a16="http://schemas.microsoft.com/office/drawing/2014/main" id="{82043E12-070A-BCEA-723E-0B6D706378EB}"/>
+              </a:ext>
+            </a:extLst>
+          </p:cNvPr>
+          <p:cNvCxnSpPr>
+            <a:cxnSpLocks/>
+            <a:stCxn id="12" idx="0"/>
+          </p:cNvCxnSpPr>
+          <p:nvPr/>
+        </p:nvCxnSpPr>
+        <p:spPr>
+          <a:xfrm flipH="1" flipV="1">
+            <a:off x="5114622" y="866947"/>
+            <a:ext cx="1" cy="4670862"/>
+          </a:xfrm>
+          <a:prstGeom prst="line">
+            <a:avLst/>
+          </a:prstGeom>
+          <a:ln>
+            <a:solidFill>
+              <a:schemeClr val="tx1"/>
+            </a:solidFill>
+          </a:ln>
+        </p:spPr>
+        <p:style>
+          <a:lnRef idx="1">
+            <a:schemeClr val="accent1"/>
+          </a:lnRef>
+          <a:fillRef idx="0">
+            <a:schemeClr val="accent1"/>
+          </a:fillRef>
+          <a:effectRef idx="0">
+            <a:schemeClr val="accent1"/>
+          </a:effectRef>
+          <a:fontRef idx="minor">
+            <a:schemeClr val="tx1"/>
+          </a:fontRef>
+        </p:style>
+      </p:cxnSp>
+      <p:cxnSp>
+        <p:nvCxnSpPr>
+          <p:cNvPr id="17" name="Straight Connector 16">
+            <a:extLst>
+              <a:ext uri="{FF2B5EF4-FFF2-40B4-BE49-F238E27FC236}">
+                <a16:creationId xmlns:a16="http://schemas.microsoft.com/office/drawing/2014/main" id="{A6C80C9A-760C-E903-6B5B-B74C466400E6}"/>
+              </a:ext>
+            </a:extLst>
+          </p:cNvPr>
+          <p:cNvCxnSpPr>
+            <a:cxnSpLocks/>
+          </p:cNvCxnSpPr>
+          <p:nvPr/>
+        </p:nvCxnSpPr>
+        <p:spPr>
+          <a:xfrm flipV="1">
+            <a:off x="5590749" y="866947"/>
+            <a:ext cx="0" cy="4670862"/>
+          </a:xfrm>
+          <a:prstGeom prst="line">
+            <a:avLst/>
+          </a:prstGeom>
+          <a:ln>
+            <a:solidFill>
+              <a:schemeClr val="tx1"/>
+            </a:solidFill>
+          </a:ln>
+        </p:spPr>
+        <p:style>
+          <a:lnRef idx="1">
+            <a:schemeClr val="accent1"/>
+          </a:lnRef>
+          <a:fillRef idx="0">
+            <a:schemeClr val="accent1"/>
+          </a:fillRef>
+          <a:effectRef idx="0">
+            <a:schemeClr val="accent1"/>
+          </a:effectRef>
+          <a:fontRef idx="minor">
+            <a:schemeClr val="tx1"/>
+          </a:fontRef>
+        </p:style>
+      </p:cxnSp>
+      <p:sp>
+        <p:nvSpPr>
+          <p:cNvPr id="18" name="TextBox 17">
+            <a:extLst>
+              <a:ext uri="{FF2B5EF4-FFF2-40B4-BE49-F238E27FC236}">
+                <a16:creationId xmlns:a16="http://schemas.microsoft.com/office/drawing/2014/main" id="{90710812-F596-DCC4-8807-7F575434DF8A}"/>
+              </a:ext>
+            </a:extLst>
+          </p:cNvPr>
+          <p:cNvSpPr txBox="1"/>
+          <p:nvPr/>
+        </p:nvSpPr>
+        <p:spPr>
+          <a:xfrm>
+            <a:off x="5390479" y="5537809"/>
+            <a:ext cx="424048" cy="523220"/>
+          </a:xfrm>
+          <a:prstGeom prst="rect">
+            <a:avLst/>
+          </a:prstGeom>
+          <a:noFill/>
+        </p:spPr>
+        <p:txBody>
+          <a:bodyPr wrap="square" rtlCol="0">
+            <a:spAutoFit/>
+          </a:bodyPr>
+          <a:lstStyle/>
+          <a:p>
+            <a:pPr algn="ctr"/>
+            <a:r>
+              <a:rPr lang="en-US" sz="1400" dirty="0">
+                <a:latin typeface="Times New Roman" panose="02020603050405020304" pitchFamily="18" charset="0"/>
+                <a:cs typeface="Times New Roman" panose="02020603050405020304" pitchFamily="18" charset="0"/>
+              </a:rPr>
+              <a:t>T</a:t>
+            </a:r>
+          </a:p>
+          <a:p>
+            <a:pPr algn="ctr"/>
+            <a:r>
+              <a:rPr lang="en-US" sz="1400" dirty="0">
+                <a:latin typeface="Times New Roman" panose="02020603050405020304" pitchFamily="18" charset="0"/>
+                <a:cs typeface="Times New Roman" panose="02020603050405020304" pitchFamily="18" charset="0"/>
+              </a:rPr>
+              <a:t>2</a:t>
+            </a:r>
+          </a:p>
+        </p:txBody>
+      </p:sp>
+      <p:cxnSp>
+        <p:nvCxnSpPr>
+          <p:cNvPr id="19" name="Straight Connector 18">
+            <a:extLst>
+              <a:ext uri="{FF2B5EF4-FFF2-40B4-BE49-F238E27FC236}">
+                <a16:creationId xmlns:a16="http://schemas.microsoft.com/office/drawing/2014/main" id="{68979A14-56B0-15EA-BB23-E51A4679FBA9}"/>
+              </a:ext>
+            </a:extLst>
+          </p:cNvPr>
+          <p:cNvCxnSpPr>
+            <a:cxnSpLocks/>
+          </p:cNvCxnSpPr>
+          <p:nvPr/>
+        </p:nvCxnSpPr>
+        <p:spPr>
+          <a:xfrm flipV="1">
+            <a:off x="6053247" y="866947"/>
+            <a:ext cx="0" cy="4670862"/>
+          </a:xfrm>
+          <a:prstGeom prst="line">
+            <a:avLst/>
+          </a:prstGeom>
+          <a:ln>
+            <a:solidFill>
+              <a:schemeClr val="tx1"/>
+            </a:solidFill>
+          </a:ln>
+        </p:spPr>
+        <p:style>
+          <a:lnRef idx="1">
+            <a:schemeClr val="accent1"/>
+          </a:lnRef>
+          <a:fillRef idx="0">
+            <a:schemeClr val="accent1"/>
+          </a:fillRef>
+          <a:effectRef idx="0">
+            <a:schemeClr val="accent1"/>
+          </a:effectRef>
+          <a:fontRef idx="minor">
+            <a:schemeClr val="tx1"/>
+          </a:fontRef>
+        </p:style>
+      </p:cxnSp>
+      <p:sp>
+        <p:nvSpPr>
+          <p:cNvPr id="20" name="TextBox 19">
+            <a:extLst>
+              <a:ext uri="{FF2B5EF4-FFF2-40B4-BE49-F238E27FC236}">
+                <a16:creationId xmlns:a16="http://schemas.microsoft.com/office/drawing/2014/main" id="{479621F8-0203-52DE-1CD8-096E20319D8F}"/>
+              </a:ext>
+            </a:extLst>
+          </p:cNvPr>
+          <p:cNvSpPr txBox="1"/>
+          <p:nvPr/>
+        </p:nvSpPr>
+        <p:spPr>
+          <a:xfrm>
+            <a:off x="5841222" y="5537809"/>
+            <a:ext cx="424048" cy="523220"/>
+          </a:xfrm>
+          <a:prstGeom prst="rect">
+            <a:avLst/>
+          </a:prstGeom>
+          <a:noFill/>
+        </p:spPr>
+        <p:txBody>
+          <a:bodyPr wrap="square" rtlCol="0">
+            <a:spAutoFit/>
+          </a:bodyPr>
+          <a:lstStyle/>
+          <a:p>
+            <a:pPr algn="ctr"/>
+            <a:r>
+              <a:rPr lang="en-US" sz="1400" dirty="0">
+                <a:latin typeface="Times New Roman" panose="02020603050405020304" pitchFamily="18" charset="0"/>
+                <a:cs typeface="Times New Roman" panose="02020603050405020304" pitchFamily="18" charset="0"/>
+              </a:rPr>
+              <a:t>T</a:t>
+            </a:r>
+          </a:p>
+          <a:p>
+            <a:pPr algn="ctr"/>
+            <a:r>
+              <a:rPr lang="en-US" sz="1400" dirty="0">
+                <a:latin typeface="Times New Roman" panose="02020603050405020304" pitchFamily="18" charset="0"/>
+                <a:cs typeface="Times New Roman" panose="02020603050405020304" pitchFamily="18" charset="0"/>
+              </a:rPr>
+              <a:t>3</a:t>
+            </a:r>
+          </a:p>
+        </p:txBody>
+      </p:sp>
+      <p:cxnSp>
+        <p:nvCxnSpPr>
+          <p:cNvPr id="21" name="Straight Connector 20">
+            <a:extLst>
+              <a:ext uri="{FF2B5EF4-FFF2-40B4-BE49-F238E27FC236}">
+                <a16:creationId xmlns:a16="http://schemas.microsoft.com/office/drawing/2014/main" id="{85675E33-2EEC-1656-5610-83274DD0704F}"/>
+              </a:ext>
+            </a:extLst>
+          </p:cNvPr>
+          <p:cNvCxnSpPr>
+            <a:cxnSpLocks/>
+          </p:cNvCxnSpPr>
+          <p:nvPr/>
+        </p:nvCxnSpPr>
+        <p:spPr>
+          <a:xfrm flipV="1">
+            <a:off x="6519039" y="866947"/>
+            <a:ext cx="0" cy="4670862"/>
+          </a:xfrm>
+          <a:prstGeom prst="line">
+            <a:avLst/>
+          </a:prstGeom>
+          <a:ln>
+            <a:solidFill>
+              <a:schemeClr val="tx1"/>
+            </a:solidFill>
+          </a:ln>
+        </p:spPr>
+        <p:style>
+          <a:lnRef idx="1">
+            <a:schemeClr val="accent1"/>
+          </a:lnRef>
+          <a:fillRef idx="0">
+            <a:schemeClr val="accent1"/>
+          </a:fillRef>
+          <a:effectRef idx="0">
+            <a:schemeClr val="accent1"/>
+          </a:effectRef>
+          <a:fontRef idx="minor">
+            <a:schemeClr val="tx1"/>
+          </a:fontRef>
+        </p:style>
+      </p:cxnSp>
+      <p:sp>
+        <p:nvSpPr>
+          <p:cNvPr id="22" name="TextBox 21">
+            <a:extLst>
+              <a:ext uri="{FF2B5EF4-FFF2-40B4-BE49-F238E27FC236}">
+                <a16:creationId xmlns:a16="http://schemas.microsoft.com/office/drawing/2014/main" id="{9D2EBD56-3026-7E4D-04CD-48585F57D904}"/>
+              </a:ext>
+            </a:extLst>
+          </p:cNvPr>
+          <p:cNvSpPr txBox="1"/>
+          <p:nvPr/>
+        </p:nvSpPr>
+        <p:spPr>
+          <a:xfrm>
+            <a:off x="6307706" y="5537809"/>
+            <a:ext cx="424048" cy="523220"/>
+          </a:xfrm>
+          <a:prstGeom prst="rect">
+            <a:avLst/>
+          </a:prstGeom>
+          <a:noFill/>
+        </p:spPr>
+        <p:txBody>
+          <a:bodyPr wrap="square" rtlCol="0">
+            <a:spAutoFit/>
+          </a:bodyPr>
+          <a:lstStyle/>
+          <a:p>
+            <a:pPr algn="ctr"/>
+            <a:r>
+              <a:rPr lang="en-US" sz="1400" dirty="0">
+                <a:latin typeface="Times New Roman" panose="02020603050405020304" pitchFamily="18" charset="0"/>
+                <a:cs typeface="Times New Roman" panose="02020603050405020304" pitchFamily="18" charset="0"/>
+              </a:rPr>
+              <a:t>T</a:t>
+            </a:r>
+          </a:p>
+          <a:p>
+            <a:pPr algn="ctr"/>
+            <a:r>
+              <a:rPr lang="en-US" sz="1400" dirty="0">
+                <a:latin typeface="Times New Roman" panose="02020603050405020304" pitchFamily="18" charset="0"/>
+                <a:cs typeface="Times New Roman" panose="02020603050405020304" pitchFamily="18" charset="0"/>
+              </a:rPr>
+              <a:t>4</a:t>
+            </a:r>
+          </a:p>
+        </p:txBody>
+      </p:sp>
+      <p:sp>
+        <p:nvSpPr>
+          <p:cNvPr id="23" name="Rectangle 22">
+            <a:extLst>
+              <a:ext uri="{FF2B5EF4-FFF2-40B4-BE49-F238E27FC236}">
+                <a16:creationId xmlns:a16="http://schemas.microsoft.com/office/drawing/2014/main" id="{4A5FB1B5-1DC4-BE00-E1B2-EDF1A09F3F2A}"/>
+              </a:ext>
+            </a:extLst>
+          </p:cNvPr>
+          <p:cNvSpPr/>
+          <p:nvPr/>
+        </p:nvSpPr>
+        <p:spPr>
+          <a:xfrm>
+            <a:off x="7770824" y="4838198"/>
+            <a:ext cx="471716" cy="211405"/>
+          </a:xfrm>
+          <a:prstGeom prst="rect">
+            <a:avLst/>
+          </a:prstGeom>
+          <a:solidFill>
+            <a:srgbClr val="B71E42"/>
+          </a:solidFill>
+          <a:ln>
+            <a:noFill/>
+          </a:ln>
+        </p:spPr>
+        <p:style>
+          <a:lnRef idx="2">
+            <a:schemeClr val="accent1">
+              <a:shade val="50000"/>
+            </a:schemeClr>
+          </a:lnRef>
+          <a:fillRef idx="1">
+            <a:schemeClr val="accent1"/>
+          </a:fillRef>
+          <a:effectRef idx="0">
+            <a:schemeClr val="accent1"/>
+          </a:effectRef>
+          <a:fontRef idx="minor">
+            <a:schemeClr val="lt1"/>
+          </a:fontRef>
+        </p:style>
+        <p:txBody>
+          <a:bodyPr rtlCol="0" anchor="ctr"/>
+          <a:lstStyle/>
+          <a:p>
+            <a:pPr algn="ctr"/>
+            <a:r>
+              <a:rPr lang="en-US" sz="1050" dirty="0"/>
+              <a:t>INT</a:t>
+            </a:r>
+          </a:p>
+        </p:txBody>
+      </p:sp>
+      <p:cxnSp>
+        <p:nvCxnSpPr>
+          <p:cNvPr id="24" name="Straight Connector 23">
+            <a:extLst>
+              <a:ext uri="{FF2B5EF4-FFF2-40B4-BE49-F238E27FC236}">
+                <a16:creationId xmlns:a16="http://schemas.microsoft.com/office/drawing/2014/main" id="{0E2DC555-3CD8-6ADC-04F1-CE3A14C6A8AC}"/>
+              </a:ext>
+            </a:extLst>
+          </p:cNvPr>
+          <p:cNvCxnSpPr>
+            <a:cxnSpLocks/>
+          </p:cNvCxnSpPr>
+          <p:nvPr/>
+        </p:nvCxnSpPr>
+        <p:spPr>
+          <a:xfrm flipV="1">
+            <a:off x="6976642" y="866947"/>
+            <a:ext cx="0" cy="4670862"/>
+          </a:xfrm>
+          <a:prstGeom prst="line">
+            <a:avLst/>
+          </a:prstGeom>
+          <a:ln>
+            <a:solidFill>
+              <a:schemeClr val="tx1"/>
+            </a:solidFill>
+          </a:ln>
+        </p:spPr>
+        <p:style>
+          <a:lnRef idx="1">
+            <a:schemeClr val="accent1"/>
+          </a:lnRef>
+          <a:fillRef idx="0">
+            <a:schemeClr val="accent1"/>
+          </a:fillRef>
+          <a:effectRef idx="0">
+            <a:schemeClr val="accent1"/>
+          </a:effectRef>
+          <a:fontRef idx="minor">
+            <a:schemeClr val="tx1"/>
+          </a:fontRef>
+        </p:style>
+      </p:cxnSp>
+      <p:sp>
+        <p:nvSpPr>
+          <p:cNvPr id="25" name="TextBox 24">
+            <a:extLst>
+              <a:ext uri="{FF2B5EF4-FFF2-40B4-BE49-F238E27FC236}">
+                <a16:creationId xmlns:a16="http://schemas.microsoft.com/office/drawing/2014/main" id="{9BD7CBD3-CA54-CC30-8158-2756FFE2B640}"/>
+              </a:ext>
+            </a:extLst>
+          </p:cNvPr>
+          <p:cNvSpPr txBox="1"/>
+          <p:nvPr/>
+        </p:nvSpPr>
+        <p:spPr>
+          <a:xfrm>
+            <a:off x="6762990" y="5537809"/>
+            <a:ext cx="424048" cy="523220"/>
+          </a:xfrm>
+          <a:prstGeom prst="rect">
+            <a:avLst/>
+          </a:prstGeom>
+          <a:noFill/>
+        </p:spPr>
+        <p:txBody>
+          <a:bodyPr wrap="square" rtlCol="0">
+            <a:spAutoFit/>
+          </a:bodyPr>
+          <a:lstStyle/>
+          <a:p>
+            <a:pPr algn="ctr"/>
+            <a:r>
+              <a:rPr lang="en-US" sz="1400" dirty="0">
+                <a:latin typeface="Times New Roman" panose="02020603050405020304" pitchFamily="18" charset="0"/>
+                <a:cs typeface="Times New Roman" panose="02020603050405020304" pitchFamily="18" charset="0"/>
+              </a:rPr>
+              <a:t>T</a:t>
+            </a:r>
+          </a:p>
+          <a:p>
+            <a:pPr algn="ctr"/>
+            <a:r>
+              <a:rPr lang="en-US" sz="1400" dirty="0">
+                <a:latin typeface="Times New Roman" panose="02020603050405020304" pitchFamily="18" charset="0"/>
+                <a:cs typeface="Times New Roman" panose="02020603050405020304" pitchFamily="18" charset="0"/>
+              </a:rPr>
+              <a:t>5</a:t>
+            </a:r>
+          </a:p>
+        </p:txBody>
+      </p:sp>
+      <p:cxnSp>
+        <p:nvCxnSpPr>
+          <p:cNvPr id="27" name="Straight Connector 26">
+            <a:extLst>
+              <a:ext uri="{FF2B5EF4-FFF2-40B4-BE49-F238E27FC236}">
+                <a16:creationId xmlns:a16="http://schemas.microsoft.com/office/drawing/2014/main" id="{9BE1928B-5879-03F7-40FF-AC7258D61B77}"/>
+              </a:ext>
+            </a:extLst>
+          </p:cNvPr>
+          <p:cNvCxnSpPr>
+            <a:cxnSpLocks/>
+          </p:cNvCxnSpPr>
+          <p:nvPr/>
+        </p:nvCxnSpPr>
+        <p:spPr>
+          <a:xfrm flipV="1">
+            <a:off x="7763788" y="866947"/>
+            <a:ext cx="0" cy="4670862"/>
+          </a:xfrm>
+          <a:prstGeom prst="line">
+            <a:avLst/>
+          </a:prstGeom>
+          <a:ln>
+            <a:solidFill>
+              <a:schemeClr val="tx1"/>
+            </a:solidFill>
+          </a:ln>
+        </p:spPr>
+        <p:style>
+          <a:lnRef idx="1">
+            <a:schemeClr val="accent1"/>
+          </a:lnRef>
+          <a:fillRef idx="0">
+            <a:schemeClr val="accent1"/>
+          </a:fillRef>
+          <a:effectRef idx="0">
+            <a:schemeClr val="accent1"/>
+          </a:effectRef>
+          <a:fontRef idx="minor">
+            <a:schemeClr val="tx1"/>
+          </a:fontRef>
+        </p:style>
+      </p:cxnSp>
+      <p:sp>
+        <p:nvSpPr>
+          <p:cNvPr id="28" name="TextBox 27">
+            <a:extLst>
+              <a:ext uri="{FF2B5EF4-FFF2-40B4-BE49-F238E27FC236}">
+                <a16:creationId xmlns:a16="http://schemas.microsoft.com/office/drawing/2014/main" id="{63BBB917-A4D5-A0F5-A139-C14FB0BF59EB}"/>
+              </a:ext>
+            </a:extLst>
+          </p:cNvPr>
+          <p:cNvSpPr txBox="1"/>
+          <p:nvPr/>
+        </p:nvSpPr>
+        <p:spPr>
+          <a:xfrm>
+            <a:off x="6947409" y="5537809"/>
+            <a:ext cx="424048" cy="523220"/>
+          </a:xfrm>
+          <a:prstGeom prst="rect">
+            <a:avLst/>
+          </a:prstGeom>
+          <a:noFill/>
+        </p:spPr>
+        <p:txBody>
+          <a:bodyPr wrap="square" rtlCol="0">
+            <a:spAutoFit/>
+          </a:bodyPr>
+          <a:lstStyle/>
+          <a:p>
+            <a:pPr algn="ctr"/>
+            <a:r>
+              <a:rPr lang="en-US" sz="1400" dirty="0">
+                <a:latin typeface="Times New Roman" panose="02020603050405020304" pitchFamily="18" charset="0"/>
+                <a:cs typeface="Times New Roman" panose="02020603050405020304" pitchFamily="18" charset="0"/>
+              </a:rPr>
+              <a:t>T</a:t>
+            </a:r>
+          </a:p>
+          <a:p>
+            <a:pPr algn="ctr"/>
+            <a:r>
+              <a:rPr lang="en-US" sz="1400" dirty="0">
+                <a:latin typeface="Times New Roman" panose="02020603050405020304" pitchFamily="18" charset="0"/>
+                <a:cs typeface="Times New Roman" panose="02020603050405020304" pitchFamily="18" charset="0"/>
+              </a:rPr>
+              <a:t>6</a:t>
+            </a:r>
+          </a:p>
+        </p:txBody>
+      </p:sp>
+      <p:cxnSp>
+        <p:nvCxnSpPr>
+          <p:cNvPr id="30" name="Straight Connector 29">
+            <a:extLst>
+              <a:ext uri="{FF2B5EF4-FFF2-40B4-BE49-F238E27FC236}">
+                <a16:creationId xmlns:a16="http://schemas.microsoft.com/office/drawing/2014/main" id="{F38CEA05-3DC7-0925-8656-8BF9100C56FA}"/>
+              </a:ext>
+            </a:extLst>
+          </p:cNvPr>
+          <p:cNvCxnSpPr>
+            <a:cxnSpLocks/>
+          </p:cNvCxnSpPr>
+          <p:nvPr/>
+        </p:nvCxnSpPr>
+        <p:spPr>
+          <a:xfrm flipV="1">
+            <a:off x="9331918" y="866947"/>
+            <a:ext cx="0" cy="4670862"/>
+          </a:xfrm>
+          <a:prstGeom prst="line">
+            <a:avLst/>
+          </a:prstGeom>
+          <a:ln>
+            <a:solidFill>
+              <a:schemeClr val="tx1"/>
+            </a:solidFill>
+          </a:ln>
+        </p:spPr>
+        <p:style>
+          <a:lnRef idx="1">
+            <a:schemeClr val="accent1"/>
+          </a:lnRef>
+          <a:fillRef idx="0">
+            <a:schemeClr val="accent1"/>
+          </a:fillRef>
+          <a:effectRef idx="0">
+            <a:schemeClr val="accent1"/>
+          </a:effectRef>
+          <a:fontRef idx="minor">
+            <a:schemeClr val="tx1"/>
+          </a:fontRef>
+        </p:style>
+      </p:cxnSp>
+      <p:sp>
+        <p:nvSpPr>
+          <p:cNvPr id="32" name="Rectangle 31">
+            <a:extLst>
+              <a:ext uri="{FF2B5EF4-FFF2-40B4-BE49-F238E27FC236}">
+                <a16:creationId xmlns:a16="http://schemas.microsoft.com/office/drawing/2014/main" id="{FF72BB4F-A3B8-5CA8-6B0C-9751990F25B9}"/>
+              </a:ext>
+            </a:extLst>
+          </p:cNvPr>
+          <p:cNvSpPr/>
+          <p:nvPr/>
+        </p:nvSpPr>
+        <p:spPr>
+          <a:xfrm>
+            <a:off x="5124911" y="1119171"/>
+            <a:ext cx="467838" cy="208585"/>
+          </a:xfrm>
+          <a:prstGeom prst="rect">
+            <a:avLst/>
+          </a:prstGeom>
+          <a:solidFill>
+            <a:schemeClr val="accent4">
+              <a:lumMod val="75000"/>
+            </a:schemeClr>
+          </a:solidFill>
+          <a:ln>
+            <a:noFill/>
+          </a:ln>
+        </p:spPr>
+        <p:style>
+          <a:lnRef idx="2">
+            <a:schemeClr val="accent1">
+              <a:shade val="50000"/>
+            </a:schemeClr>
+          </a:lnRef>
+          <a:fillRef idx="1">
+            <a:schemeClr val="accent1"/>
+          </a:fillRef>
+          <a:effectRef idx="0">
+            <a:schemeClr val="accent1"/>
+          </a:effectRef>
+          <a:fontRef idx="minor">
+            <a:schemeClr val="lt1"/>
+          </a:fontRef>
+        </p:style>
+        <p:txBody>
+          <a:bodyPr rtlCol="0" anchor="ctr"/>
+          <a:lstStyle/>
+          <a:p>
+            <a:pPr algn="ctr"/>
+            <a:endParaRPr lang="en-US"/>
+          </a:p>
+        </p:txBody>
+      </p:sp>
+      <p:cxnSp>
+        <p:nvCxnSpPr>
+          <p:cNvPr id="33" name="Straight Connector 32">
+            <a:extLst>
+              <a:ext uri="{FF2B5EF4-FFF2-40B4-BE49-F238E27FC236}">
+                <a16:creationId xmlns:a16="http://schemas.microsoft.com/office/drawing/2014/main" id="{01D56752-640B-DFC3-7427-5315EF6818EC}"/>
+              </a:ext>
+            </a:extLst>
+          </p:cNvPr>
+          <p:cNvCxnSpPr>
+            <a:cxnSpLocks/>
+          </p:cNvCxnSpPr>
+          <p:nvPr/>
+        </p:nvCxnSpPr>
+        <p:spPr>
+          <a:xfrm flipV="1">
+            <a:off x="9973557" y="866947"/>
+            <a:ext cx="0" cy="4670862"/>
+          </a:xfrm>
+          <a:prstGeom prst="line">
+            <a:avLst/>
+          </a:prstGeom>
+          <a:ln>
+            <a:solidFill>
+              <a:schemeClr val="tx1"/>
+            </a:solidFill>
+          </a:ln>
+        </p:spPr>
+        <p:style>
+          <a:lnRef idx="1">
+            <a:schemeClr val="accent1"/>
+          </a:lnRef>
+          <a:fillRef idx="0">
+            <a:schemeClr val="accent1"/>
+          </a:fillRef>
+          <a:effectRef idx="0">
+            <a:schemeClr val="accent1"/>
+          </a:effectRef>
+          <a:fontRef idx="minor">
+            <a:schemeClr val="tx1"/>
+          </a:fontRef>
+        </p:style>
+      </p:cxnSp>
+      <p:sp>
+        <p:nvSpPr>
+          <p:cNvPr id="34" name="TextBox 33">
+            <a:extLst>
+              <a:ext uri="{FF2B5EF4-FFF2-40B4-BE49-F238E27FC236}">
+                <a16:creationId xmlns:a16="http://schemas.microsoft.com/office/drawing/2014/main" id="{7FB177A7-3E8B-20B9-7EF9-B06633062F07}"/>
+              </a:ext>
+            </a:extLst>
+          </p:cNvPr>
+          <p:cNvSpPr txBox="1"/>
+          <p:nvPr/>
+        </p:nvSpPr>
+        <p:spPr>
+          <a:xfrm>
+            <a:off x="7134062" y="5537809"/>
+            <a:ext cx="424048" cy="523220"/>
+          </a:xfrm>
+          <a:prstGeom prst="rect">
+            <a:avLst/>
+          </a:prstGeom>
+          <a:noFill/>
+        </p:spPr>
+        <p:txBody>
+          <a:bodyPr wrap="square" rtlCol="0">
+            <a:spAutoFit/>
+          </a:bodyPr>
+          <a:lstStyle/>
+          <a:p>
+            <a:pPr algn="ctr"/>
+            <a:r>
+              <a:rPr lang="en-US" sz="1400" dirty="0">
+                <a:latin typeface="Times New Roman" panose="02020603050405020304" pitchFamily="18" charset="0"/>
+                <a:cs typeface="Times New Roman" panose="02020603050405020304" pitchFamily="18" charset="0"/>
+              </a:rPr>
+              <a:t>T</a:t>
+            </a:r>
+          </a:p>
+          <a:p>
+            <a:pPr algn="ctr"/>
+            <a:r>
+              <a:rPr lang="en-US" sz="1400" dirty="0">
+                <a:latin typeface="Times New Roman" panose="02020603050405020304" pitchFamily="18" charset="0"/>
+                <a:cs typeface="Times New Roman" panose="02020603050405020304" pitchFamily="18" charset="0"/>
+              </a:rPr>
+              <a:t>7</a:t>
+            </a:r>
+          </a:p>
+        </p:txBody>
+      </p:sp>
+      <p:sp>
+        <p:nvSpPr>
+          <p:cNvPr id="35" name="TextBox 34">
+            <a:extLst>
+              <a:ext uri="{FF2B5EF4-FFF2-40B4-BE49-F238E27FC236}">
+                <a16:creationId xmlns:a16="http://schemas.microsoft.com/office/drawing/2014/main" id="{6E559A69-F0DF-8F00-A017-8D503FE76885}"/>
+              </a:ext>
+            </a:extLst>
+          </p:cNvPr>
+          <p:cNvSpPr txBox="1"/>
+          <p:nvPr/>
+        </p:nvSpPr>
+        <p:spPr>
+          <a:xfrm>
+            <a:off x="7295373" y="5537809"/>
+            <a:ext cx="424048" cy="523220"/>
+          </a:xfrm>
+          <a:prstGeom prst="rect">
+            <a:avLst/>
+          </a:prstGeom>
+          <a:noFill/>
+        </p:spPr>
+        <p:txBody>
+          <a:bodyPr wrap="square" rtlCol="0">
+            <a:spAutoFit/>
+          </a:bodyPr>
+          <a:lstStyle/>
+          <a:p>
+            <a:pPr algn="ctr"/>
+            <a:r>
+              <a:rPr lang="en-US" sz="1400" dirty="0">
+                <a:latin typeface="Times New Roman" panose="02020603050405020304" pitchFamily="18" charset="0"/>
+                <a:cs typeface="Times New Roman" panose="02020603050405020304" pitchFamily="18" charset="0"/>
+              </a:rPr>
+              <a:t>T</a:t>
+            </a:r>
+          </a:p>
+          <a:p>
+            <a:pPr algn="ctr"/>
+            <a:r>
+              <a:rPr lang="en-US" sz="1400" dirty="0">
+                <a:latin typeface="Times New Roman" panose="02020603050405020304" pitchFamily="18" charset="0"/>
+                <a:cs typeface="Times New Roman" panose="02020603050405020304" pitchFamily="18" charset="0"/>
+              </a:rPr>
+              <a:t>8</a:t>
+            </a:r>
+          </a:p>
+        </p:txBody>
+      </p:sp>
+      <p:cxnSp>
+        <p:nvCxnSpPr>
+          <p:cNvPr id="37" name="Straight Connector 36">
+            <a:extLst>
+              <a:ext uri="{FF2B5EF4-FFF2-40B4-BE49-F238E27FC236}">
+                <a16:creationId xmlns:a16="http://schemas.microsoft.com/office/drawing/2014/main" id="{662CF52E-75D5-D440-910F-84872D3110DA}"/>
+              </a:ext>
+            </a:extLst>
+          </p:cNvPr>
+          <p:cNvCxnSpPr>
+            <a:cxnSpLocks/>
+          </p:cNvCxnSpPr>
+          <p:nvPr/>
+        </p:nvCxnSpPr>
+        <p:spPr>
+          <a:xfrm flipV="1">
+            <a:off x="11373101" y="866947"/>
+            <a:ext cx="0" cy="4670862"/>
+          </a:xfrm>
+          <a:prstGeom prst="line">
+            <a:avLst/>
+          </a:prstGeom>
+          <a:ln>
+            <a:solidFill>
+              <a:schemeClr val="tx1"/>
+            </a:solidFill>
+          </a:ln>
+        </p:spPr>
+        <p:style>
+          <a:lnRef idx="1">
+            <a:schemeClr val="accent1"/>
+          </a:lnRef>
+          <a:fillRef idx="0">
+            <a:schemeClr val="accent1"/>
+          </a:fillRef>
+          <a:effectRef idx="0">
+            <a:schemeClr val="accent1"/>
+          </a:effectRef>
+          <a:fontRef idx="minor">
+            <a:schemeClr val="tx1"/>
+          </a:fontRef>
+        </p:style>
+      </p:cxnSp>
+      <p:sp>
+        <p:nvSpPr>
+          <p:cNvPr id="38" name="TextBox 37">
+            <a:extLst>
+              <a:ext uri="{FF2B5EF4-FFF2-40B4-BE49-F238E27FC236}">
+                <a16:creationId xmlns:a16="http://schemas.microsoft.com/office/drawing/2014/main" id="{DA74CD76-E2D9-B940-32A1-0591FBF74636}"/>
+              </a:ext>
+            </a:extLst>
+          </p:cNvPr>
+          <p:cNvSpPr txBox="1"/>
+          <p:nvPr/>
+        </p:nvSpPr>
+        <p:spPr>
+          <a:xfrm>
+            <a:off x="7550781" y="5537809"/>
+            <a:ext cx="424048" cy="523220"/>
+          </a:xfrm>
+          <a:prstGeom prst="rect">
+            <a:avLst/>
+          </a:prstGeom>
+          <a:noFill/>
+        </p:spPr>
+        <p:txBody>
+          <a:bodyPr wrap="square" rtlCol="0">
+            <a:spAutoFit/>
+          </a:bodyPr>
+          <a:lstStyle/>
+          <a:p>
+            <a:pPr algn="ctr"/>
+            <a:r>
+              <a:rPr lang="en-US" sz="1400" dirty="0">
+                <a:latin typeface="Times New Roman" panose="02020603050405020304" pitchFamily="18" charset="0"/>
+                <a:cs typeface="Times New Roman" panose="02020603050405020304" pitchFamily="18" charset="0"/>
+              </a:rPr>
+              <a:t>T</a:t>
+            </a:r>
+          </a:p>
+          <a:p>
+            <a:pPr algn="ctr"/>
+            <a:r>
+              <a:rPr lang="en-US" sz="1400" dirty="0">
+                <a:latin typeface="Times New Roman" panose="02020603050405020304" pitchFamily="18" charset="0"/>
+                <a:cs typeface="Times New Roman" panose="02020603050405020304" pitchFamily="18" charset="0"/>
+              </a:rPr>
+              <a:t>9</a:t>
+            </a:r>
+          </a:p>
+        </p:txBody>
+      </p:sp>
+      <p:sp>
+        <p:nvSpPr>
+          <p:cNvPr id="40" name="Rectangle 39">
+            <a:extLst>
+              <a:ext uri="{FF2B5EF4-FFF2-40B4-BE49-F238E27FC236}">
+                <a16:creationId xmlns:a16="http://schemas.microsoft.com/office/drawing/2014/main" id="{66E3374C-5F8F-5653-89E4-BBDBBA788FEB}"/>
+              </a:ext>
+            </a:extLst>
+          </p:cNvPr>
+          <p:cNvSpPr/>
+          <p:nvPr/>
+        </p:nvSpPr>
+        <p:spPr>
+          <a:xfrm>
+            <a:off x="3482225" y="4609125"/>
+            <a:ext cx="1459247" cy="666733"/>
+          </a:xfrm>
+          <a:prstGeom prst="rect">
+            <a:avLst/>
+          </a:prstGeom>
+          <a:solidFill>
+            <a:schemeClr val="accent6">
+              <a:lumMod val="75000"/>
+            </a:schemeClr>
+          </a:solidFill>
+        </p:spPr>
+        <p:style>
+          <a:lnRef idx="2">
+            <a:schemeClr val="accent1">
+              <a:shade val="50000"/>
+            </a:schemeClr>
+          </a:lnRef>
+          <a:fillRef idx="1">
+            <a:schemeClr val="accent1"/>
+          </a:fillRef>
+          <a:effectRef idx="0">
+            <a:schemeClr val="accent1"/>
+          </a:effectRef>
+          <a:fontRef idx="minor">
+            <a:schemeClr val="lt1"/>
+          </a:fontRef>
+        </p:style>
+        <p:txBody>
+          <a:bodyPr rtlCol="0" anchor="ctr"/>
+          <a:lstStyle/>
+          <a:p>
+            <a:pPr algn="ctr"/>
+            <a:r>
+              <a:rPr lang="en-US" sz="2000" dirty="0">
+                <a:latin typeface="Times New Roman" panose="02020603050405020304" pitchFamily="18" charset="0"/>
+                <a:cs typeface="Times New Roman" panose="02020603050405020304" pitchFamily="18" charset="0"/>
+              </a:rPr>
+              <a:t>Task</a:t>
+            </a:r>
+          </a:p>
+          <a:p>
+            <a:pPr algn="ctr"/>
+            <a:r>
+              <a:rPr lang="en-US" sz="2000" dirty="0" err="1">
+                <a:latin typeface="Times New Roman" panose="02020603050405020304" pitchFamily="18" charset="0"/>
+                <a:cs typeface="Times New Roman" panose="02020603050405020304" pitchFamily="18" charset="0"/>
+              </a:rPr>
+              <a:t>Gempa</a:t>
+            </a:r>
+            <a:endParaRPr lang="en-US" sz="2000" dirty="0">
+              <a:latin typeface="Times New Roman" panose="02020603050405020304" pitchFamily="18" charset="0"/>
+              <a:cs typeface="Times New Roman" panose="02020603050405020304" pitchFamily="18" charset="0"/>
+            </a:endParaRPr>
+          </a:p>
+        </p:txBody>
+      </p:sp>
+      <p:sp>
+        <p:nvSpPr>
+          <p:cNvPr id="42" name="Rectangle 41">
+            <a:extLst>
+              <a:ext uri="{FF2B5EF4-FFF2-40B4-BE49-F238E27FC236}">
+                <a16:creationId xmlns:a16="http://schemas.microsoft.com/office/drawing/2014/main" id="{45EF93FE-07AE-86F8-1A74-02966FFFBCC0}"/>
+              </a:ext>
+            </a:extLst>
+          </p:cNvPr>
+          <p:cNvSpPr/>
+          <p:nvPr/>
+        </p:nvSpPr>
+        <p:spPr>
+          <a:xfrm>
+            <a:off x="5586043" y="1844456"/>
+            <a:ext cx="467838" cy="208585"/>
+          </a:xfrm>
+          <a:prstGeom prst="rect">
+            <a:avLst/>
+          </a:prstGeom>
+          <a:solidFill>
+            <a:schemeClr val="accent6">
+              <a:lumMod val="60000"/>
+              <a:lumOff val="40000"/>
+            </a:schemeClr>
+          </a:solidFill>
+          <a:ln>
+            <a:noFill/>
+          </a:ln>
+        </p:spPr>
+        <p:style>
+          <a:lnRef idx="2">
+            <a:schemeClr val="accent1">
+              <a:shade val="50000"/>
+            </a:schemeClr>
+          </a:lnRef>
+          <a:fillRef idx="1">
+            <a:schemeClr val="accent1"/>
+          </a:fillRef>
+          <a:effectRef idx="0">
+            <a:schemeClr val="accent1"/>
+          </a:effectRef>
+          <a:fontRef idx="minor">
+            <a:schemeClr val="lt1"/>
+          </a:fontRef>
+        </p:style>
+        <p:txBody>
+          <a:bodyPr rtlCol="0" anchor="ctr"/>
+          <a:lstStyle/>
+          <a:p>
+            <a:pPr algn="ctr"/>
+            <a:endParaRPr lang="en-US"/>
+          </a:p>
+        </p:txBody>
+      </p:sp>
+      <p:sp>
+        <p:nvSpPr>
+          <p:cNvPr id="44" name="Rectangle 43">
+            <a:extLst>
+              <a:ext uri="{FF2B5EF4-FFF2-40B4-BE49-F238E27FC236}">
+                <a16:creationId xmlns:a16="http://schemas.microsoft.com/office/drawing/2014/main" id="{CCD86887-73B0-0048-9FF4-C69B6CED1B41}"/>
+              </a:ext>
+            </a:extLst>
+          </p:cNvPr>
+          <p:cNvSpPr/>
+          <p:nvPr/>
+        </p:nvSpPr>
+        <p:spPr>
+          <a:xfrm>
+            <a:off x="6054883" y="1119171"/>
+            <a:ext cx="467838" cy="208585"/>
+          </a:xfrm>
+          <a:prstGeom prst="rect">
+            <a:avLst/>
+          </a:prstGeom>
+          <a:solidFill>
+            <a:schemeClr val="accent4">
+              <a:lumMod val="75000"/>
+            </a:schemeClr>
+          </a:solidFill>
+          <a:ln>
+            <a:noFill/>
+          </a:ln>
+        </p:spPr>
+        <p:style>
+          <a:lnRef idx="2">
+            <a:schemeClr val="accent1">
+              <a:shade val="50000"/>
+            </a:schemeClr>
+          </a:lnRef>
+          <a:fillRef idx="1">
+            <a:schemeClr val="accent1"/>
+          </a:fillRef>
+          <a:effectRef idx="0">
+            <a:schemeClr val="accent1"/>
+          </a:effectRef>
+          <a:fontRef idx="minor">
+            <a:schemeClr val="lt1"/>
+          </a:fontRef>
+        </p:style>
+        <p:txBody>
+          <a:bodyPr rtlCol="0" anchor="ctr"/>
+          <a:lstStyle/>
+          <a:p>
+            <a:pPr algn="ctr"/>
+            <a:endParaRPr lang="en-US"/>
+          </a:p>
+        </p:txBody>
+      </p:sp>
+      <p:sp>
+        <p:nvSpPr>
+          <p:cNvPr id="45" name="Rectangle 44">
+            <a:extLst>
+              <a:ext uri="{FF2B5EF4-FFF2-40B4-BE49-F238E27FC236}">
+                <a16:creationId xmlns:a16="http://schemas.microsoft.com/office/drawing/2014/main" id="{3207EA4E-B86C-30D1-697B-60A0EE6F1398}"/>
+              </a:ext>
+            </a:extLst>
+          </p:cNvPr>
+          <p:cNvSpPr/>
+          <p:nvPr/>
+        </p:nvSpPr>
+        <p:spPr>
+          <a:xfrm>
+            <a:off x="6520958" y="1844456"/>
+            <a:ext cx="467838" cy="208585"/>
+          </a:xfrm>
+          <a:prstGeom prst="rect">
+            <a:avLst/>
+          </a:prstGeom>
+          <a:solidFill>
+            <a:schemeClr val="accent6">
+              <a:lumMod val="60000"/>
+              <a:lumOff val="40000"/>
+            </a:schemeClr>
+          </a:solidFill>
+          <a:ln>
+            <a:noFill/>
+          </a:ln>
+        </p:spPr>
+        <p:style>
+          <a:lnRef idx="2">
+            <a:schemeClr val="accent1">
+              <a:shade val="50000"/>
+            </a:schemeClr>
+          </a:lnRef>
+          <a:fillRef idx="1">
+            <a:schemeClr val="accent1"/>
+          </a:fillRef>
+          <a:effectRef idx="0">
+            <a:schemeClr val="accent1"/>
+          </a:effectRef>
+          <a:fontRef idx="minor">
+            <a:schemeClr val="lt1"/>
+          </a:fontRef>
+        </p:style>
+        <p:txBody>
+          <a:bodyPr rtlCol="0" anchor="ctr"/>
+          <a:lstStyle/>
+          <a:p>
+            <a:pPr algn="ctr"/>
+            <a:endParaRPr lang="en-US"/>
+          </a:p>
+        </p:txBody>
+      </p:sp>
+      <p:sp>
+        <p:nvSpPr>
+          <p:cNvPr id="50" name="Rectangle 49">
+            <a:extLst>
+              <a:ext uri="{FF2B5EF4-FFF2-40B4-BE49-F238E27FC236}">
+                <a16:creationId xmlns:a16="http://schemas.microsoft.com/office/drawing/2014/main" id="{4E7184B7-1A69-6635-87EE-DE0ED217071B}"/>
+              </a:ext>
+            </a:extLst>
+          </p:cNvPr>
+          <p:cNvSpPr/>
+          <p:nvPr/>
+        </p:nvSpPr>
+        <p:spPr>
+          <a:xfrm flipH="1">
+            <a:off x="8709022" y="1119171"/>
+            <a:ext cx="268516" cy="208585"/>
+          </a:xfrm>
+          <a:prstGeom prst="rect">
+            <a:avLst/>
+          </a:prstGeom>
+          <a:solidFill>
+            <a:schemeClr val="accent4">
+              <a:lumMod val="75000"/>
+            </a:schemeClr>
+          </a:solidFill>
+          <a:ln>
+            <a:noFill/>
+          </a:ln>
+        </p:spPr>
+        <p:style>
+          <a:lnRef idx="2">
+            <a:schemeClr val="accent1">
+              <a:shade val="50000"/>
+            </a:schemeClr>
+          </a:lnRef>
+          <a:fillRef idx="1">
+            <a:schemeClr val="accent1"/>
+          </a:fillRef>
+          <a:effectRef idx="0">
+            <a:schemeClr val="accent1"/>
+          </a:effectRef>
+          <a:fontRef idx="minor">
+            <a:schemeClr val="lt1"/>
+          </a:fontRef>
+        </p:style>
+        <p:txBody>
+          <a:bodyPr rtlCol="0" anchor="ctr"/>
+          <a:lstStyle/>
+          <a:p>
+            <a:pPr algn="ctr"/>
+            <a:endParaRPr lang="en-US"/>
+          </a:p>
+        </p:txBody>
+      </p:sp>
+      <p:sp>
+        <p:nvSpPr>
+          <p:cNvPr id="52" name="Rectangle 51">
+            <a:extLst>
+              <a:ext uri="{FF2B5EF4-FFF2-40B4-BE49-F238E27FC236}">
+                <a16:creationId xmlns:a16="http://schemas.microsoft.com/office/drawing/2014/main" id="{528ACBB1-5F7F-6653-11B6-D8D0095F0582}"/>
+              </a:ext>
+            </a:extLst>
+          </p:cNvPr>
+          <p:cNvSpPr/>
+          <p:nvPr/>
+        </p:nvSpPr>
+        <p:spPr>
+          <a:xfrm>
+            <a:off x="6986877" y="2589182"/>
+            <a:ext cx="176943" cy="208573"/>
+          </a:xfrm>
+          <a:prstGeom prst="rect">
+            <a:avLst/>
+          </a:prstGeom>
+          <a:solidFill>
+            <a:srgbClr val="00B050"/>
+          </a:solidFill>
+          <a:ln>
+            <a:noFill/>
+          </a:ln>
+        </p:spPr>
+        <p:style>
+          <a:lnRef idx="2">
+            <a:schemeClr val="accent1">
+              <a:shade val="50000"/>
+            </a:schemeClr>
+          </a:lnRef>
+          <a:fillRef idx="1">
+            <a:schemeClr val="accent1"/>
+          </a:fillRef>
+          <a:effectRef idx="0">
+            <a:schemeClr val="accent1"/>
+          </a:effectRef>
+          <a:fontRef idx="minor">
+            <a:schemeClr val="lt1"/>
+          </a:fontRef>
+        </p:style>
+        <p:txBody>
+          <a:bodyPr rtlCol="0" anchor="ctr"/>
+          <a:lstStyle/>
+          <a:p>
+            <a:pPr algn="ctr"/>
+            <a:endParaRPr lang="en-US"/>
+          </a:p>
+        </p:txBody>
+      </p:sp>
+      <p:cxnSp>
+        <p:nvCxnSpPr>
+          <p:cNvPr id="54" name="Straight Connector 53">
+            <a:extLst>
+              <a:ext uri="{FF2B5EF4-FFF2-40B4-BE49-F238E27FC236}">
+                <a16:creationId xmlns:a16="http://schemas.microsoft.com/office/drawing/2014/main" id="{F38805D0-D69B-6C99-71B9-4C5E774E6AA8}"/>
+              </a:ext>
+            </a:extLst>
+          </p:cNvPr>
+          <p:cNvCxnSpPr>
+            <a:cxnSpLocks/>
+          </p:cNvCxnSpPr>
+          <p:nvPr/>
+        </p:nvCxnSpPr>
+        <p:spPr>
+          <a:xfrm flipV="1">
+            <a:off x="7163820" y="866947"/>
+            <a:ext cx="0" cy="4670862"/>
+          </a:xfrm>
+          <a:prstGeom prst="line">
+            <a:avLst/>
+          </a:prstGeom>
+          <a:ln>
+            <a:solidFill>
+              <a:schemeClr val="tx1"/>
+            </a:solidFill>
+          </a:ln>
+        </p:spPr>
+        <p:style>
+          <a:lnRef idx="1">
+            <a:schemeClr val="accent1"/>
+          </a:lnRef>
+          <a:fillRef idx="0">
+            <a:schemeClr val="accent1"/>
+          </a:fillRef>
+          <a:effectRef idx="0">
+            <a:schemeClr val="accent1"/>
+          </a:effectRef>
+          <a:fontRef idx="minor">
+            <a:schemeClr val="tx1"/>
+          </a:fontRef>
+        </p:style>
+      </p:cxnSp>
+      <p:sp>
+        <p:nvSpPr>
+          <p:cNvPr id="55" name="Rectangle 54">
+            <a:extLst>
+              <a:ext uri="{FF2B5EF4-FFF2-40B4-BE49-F238E27FC236}">
+                <a16:creationId xmlns:a16="http://schemas.microsoft.com/office/drawing/2014/main" id="{F0786B4E-092C-1423-2869-FD64614994D4}"/>
+              </a:ext>
+            </a:extLst>
+          </p:cNvPr>
+          <p:cNvSpPr/>
+          <p:nvPr/>
+        </p:nvSpPr>
+        <p:spPr>
+          <a:xfrm>
+            <a:off x="7164465" y="3336424"/>
+            <a:ext cx="176943" cy="208573"/>
+          </a:xfrm>
+          <a:prstGeom prst="rect">
+            <a:avLst/>
+          </a:prstGeom>
+          <a:solidFill>
+            <a:schemeClr val="accent2"/>
+          </a:solidFill>
+          <a:ln>
+            <a:noFill/>
+          </a:ln>
+        </p:spPr>
+        <p:style>
+          <a:lnRef idx="2">
+            <a:schemeClr val="accent1">
+              <a:shade val="50000"/>
+            </a:schemeClr>
+          </a:lnRef>
+          <a:fillRef idx="1">
+            <a:schemeClr val="accent1"/>
+          </a:fillRef>
+          <a:effectRef idx="0">
+            <a:schemeClr val="accent1"/>
+          </a:effectRef>
+          <a:fontRef idx="minor">
+            <a:schemeClr val="lt1"/>
+          </a:fontRef>
+        </p:style>
+        <p:txBody>
+          <a:bodyPr rtlCol="0" anchor="ctr"/>
+          <a:lstStyle/>
+          <a:p>
+            <a:pPr algn="ctr"/>
+            <a:endParaRPr lang="en-US"/>
+          </a:p>
+        </p:txBody>
+      </p:sp>
+      <p:sp>
+        <p:nvSpPr>
+          <p:cNvPr id="56" name="Rectangle 55">
+            <a:extLst>
+              <a:ext uri="{FF2B5EF4-FFF2-40B4-BE49-F238E27FC236}">
+                <a16:creationId xmlns:a16="http://schemas.microsoft.com/office/drawing/2014/main" id="{3FCCF863-B2E6-6BC4-34C9-747C4E3E914E}"/>
+              </a:ext>
+            </a:extLst>
+          </p:cNvPr>
+          <p:cNvSpPr/>
+          <p:nvPr/>
+        </p:nvSpPr>
+        <p:spPr>
+          <a:xfrm>
+            <a:off x="7341257" y="4089768"/>
+            <a:ext cx="176943" cy="208573"/>
+          </a:xfrm>
+          <a:prstGeom prst="rect">
+            <a:avLst/>
+          </a:prstGeom>
+          <a:solidFill>
+            <a:schemeClr val="accent1"/>
+          </a:solidFill>
+          <a:ln>
+            <a:noFill/>
+          </a:ln>
+        </p:spPr>
+        <p:style>
+          <a:lnRef idx="2">
+            <a:schemeClr val="accent1">
+              <a:shade val="50000"/>
+            </a:schemeClr>
+          </a:lnRef>
+          <a:fillRef idx="1">
+            <a:schemeClr val="accent1"/>
+          </a:fillRef>
+          <a:effectRef idx="0">
+            <a:schemeClr val="accent1"/>
+          </a:effectRef>
+          <a:fontRef idx="minor">
+            <a:schemeClr val="lt1"/>
+          </a:fontRef>
+        </p:style>
+        <p:txBody>
+          <a:bodyPr rtlCol="0" anchor="ctr"/>
+          <a:lstStyle/>
+          <a:p>
+            <a:pPr algn="ctr"/>
+            <a:endParaRPr lang="en-US"/>
+          </a:p>
+        </p:txBody>
+      </p:sp>
+      <p:cxnSp>
+        <p:nvCxnSpPr>
+          <p:cNvPr id="57" name="Straight Connector 56">
+            <a:extLst>
+              <a:ext uri="{FF2B5EF4-FFF2-40B4-BE49-F238E27FC236}">
+                <a16:creationId xmlns:a16="http://schemas.microsoft.com/office/drawing/2014/main" id="{2B7AEE05-47FD-860E-9D61-233DEC9B5628}"/>
+              </a:ext>
+            </a:extLst>
+          </p:cNvPr>
+          <p:cNvCxnSpPr>
+            <a:cxnSpLocks/>
+          </p:cNvCxnSpPr>
+          <p:nvPr/>
+        </p:nvCxnSpPr>
+        <p:spPr>
+          <a:xfrm flipV="1">
+            <a:off x="7341257" y="866947"/>
+            <a:ext cx="0" cy="4670862"/>
+          </a:xfrm>
+          <a:prstGeom prst="line">
+            <a:avLst/>
+          </a:prstGeom>
+          <a:ln>
+            <a:solidFill>
+              <a:schemeClr val="tx1"/>
+            </a:solidFill>
+          </a:ln>
+        </p:spPr>
+        <p:style>
+          <a:lnRef idx="1">
+            <a:schemeClr val="accent1"/>
+          </a:lnRef>
+          <a:fillRef idx="0">
+            <a:schemeClr val="accent1"/>
+          </a:fillRef>
+          <a:effectRef idx="0">
+            <a:schemeClr val="accent1"/>
+          </a:effectRef>
+          <a:fontRef idx="minor">
+            <a:schemeClr val="tx1"/>
+          </a:fontRef>
+        </p:style>
+      </p:cxnSp>
+      <p:cxnSp>
+        <p:nvCxnSpPr>
+          <p:cNvPr id="58" name="Straight Connector 57">
+            <a:extLst>
+              <a:ext uri="{FF2B5EF4-FFF2-40B4-BE49-F238E27FC236}">
+                <a16:creationId xmlns:a16="http://schemas.microsoft.com/office/drawing/2014/main" id="{4AF13231-0870-0C6C-7493-94ACD18008E5}"/>
+              </a:ext>
+            </a:extLst>
+          </p:cNvPr>
+          <p:cNvCxnSpPr>
+            <a:cxnSpLocks/>
+          </p:cNvCxnSpPr>
+          <p:nvPr/>
+        </p:nvCxnSpPr>
+        <p:spPr>
+          <a:xfrm flipV="1">
+            <a:off x="7502308" y="866947"/>
+            <a:ext cx="0" cy="4670862"/>
+          </a:xfrm>
+          <a:prstGeom prst="line">
+            <a:avLst/>
+          </a:prstGeom>
+          <a:ln>
+            <a:solidFill>
+              <a:schemeClr val="tx1"/>
+            </a:solidFill>
+          </a:ln>
+        </p:spPr>
+        <p:style>
+          <a:lnRef idx="1">
+            <a:schemeClr val="accent1"/>
+          </a:lnRef>
+          <a:fillRef idx="0">
+            <a:schemeClr val="accent1"/>
+          </a:fillRef>
+          <a:effectRef idx="0">
+            <a:schemeClr val="accent1"/>
+          </a:effectRef>
+          <a:fontRef idx="minor">
+            <a:schemeClr val="tx1"/>
+          </a:fontRef>
+        </p:style>
+      </p:cxnSp>
+      <p:sp>
+        <p:nvSpPr>
+          <p:cNvPr id="59" name="Rectangle 58">
+            <a:extLst>
+              <a:ext uri="{FF2B5EF4-FFF2-40B4-BE49-F238E27FC236}">
+                <a16:creationId xmlns:a16="http://schemas.microsoft.com/office/drawing/2014/main" id="{A7152ACA-19B3-13DA-0367-7CBDC9DBD70B}"/>
+              </a:ext>
+            </a:extLst>
+          </p:cNvPr>
+          <p:cNvSpPr/>
+          <p:nvPr/>
+        </p:nvSpPr>
+        <p:spPr>
+          <a:xfrm flipH="1">
+            <a:off x="7509070" y="1119171"/>
+            <a:ext cx="268516" cy="208585"/>
+          </a:xfrm>
+          <a:prstGeom prst="rect">
+            <a:avLst/>
+          </a:prstGeom>
+          <a:solidFill>
+            <a:schemeClr val="accent4">
+              <a:lumMod val="75000"/>
+            </a:schemeClr>
+          </a:solidFill>
+          <a:ln>
+            <a:noFill/>
+          </a:ln>
+        </p:spPr>
+        <p:style>
+          <a:lnRef idx="2">
+            <a:schemeClr val="accent1">
+              <a:shade val="50000"/>
+            </a:schemeClr>
+          </a:lnRef>
+          <a:fillRef idx="1">
+            <a:schemeClr val="accent1"/>
+          </a:fillRef>
+          <a:effectRef idx="0">
+            <a:schemeClr val="accent1"/>
+          </a:effectRef>
+          <a:fontRef idx="minor">
+            <a:schemeClr val="lt1"/>
+          </a:fontRef>
+        </p:style>
+        <p:txBody>
+          <a:bodyPr rtlCol="0" anchor="ctr"/>
+          <a:lstStyle/>
+          <a:p>
+            <a:pPr algn="ctr"/>
+            <a:endParaRPr lang="en-US"/>
+          </a:p>
+        </p:txBody>
+      </p:sp>
+      <p:sp>
+        <p:nvSpPr>
+          <p:cNvPr id="61" name="Rectangle 60">
+            <a:extLst>
+              <a:ext uri="{FF2B5EF4-FFF2-40B4-BE49-F238E27FC236}">
+                <a16:creationId xmlns:a16="http://schemas.microsoft.com/office/drawing/2014/main" id="{5331B645-BAEB-96BB-EA30-B389C2B7DC18}"/>
+              </a:ext>
+            </a:extLst>
+          </p:cNvPr>
+          <p:cNvSpPr/>
+          <p:nvPr/>
+        </p:nvSpPr>
+        <p:spPr>
+          <a:xfrm>
+            <a:off x="8241184" y="1844456"/>
+            <a:ext cx="467838" cy="208585"/>
+          </a:xfrm>
+          <a:prstGeom prst="rect">
+            <a:avLst/>
+          </a:prstGeom>
+          <a:solidFill>
+            <a:schemeClr val="accent6">
+              <a:lumMod val="60000"/>
+              <a:lumOff val="40000"/>
+            </a:schemeClr>
+          </a:solidFill>
+          <a:ln>
+            <a:noFill/>
+          </a:ln>
+        </p:spPr>
+        <p:style>
+          <a:lnRef idx="2">
+            <a:schemeClr val="accent1">
+              <a:shade val="50000"/>
+            </a:schemeClr>
+          </a:lnRef>
+          <a:fillRef idx="1">
+            <a:schemeClr val="accent1"/>
+          </a:fillRef>
+          <a:effectRef idx="0">
+            <a:schemeClr val="accent1"/>
+          </a:effectRef>
+          <a:fontRef idx="minor">
+            <a:schemeClr val="lt1"/>
+          </a:fontRef>
+        </p:style>
+        <p:txBody>
+          <a:bodyPr rtlCol="0" anchor="ctr"/>
+          <a:lstStyle/>
+          <a:p>
+            <a:pPr algn="ctr"/>
+            <a:endParaRPr lang="en-US"/>
+          </a:p>
+        </p:txBody>
+      </p:sp>
+      <p:cxnSp>
+        <p:nvCxnSpPr>
+          <p:cNvPr id="62" name="Straight Connector 61">
+            <a:extLst>
+              <a:ext uri="{FF2B5EF4-FFF2-40B4-BE49-F238E27FC236}">
+                <a16:creationId xmlns:a16="http://schemas.microsoft.com/office/drawing/2014/main" id="{E569043B-A8E5-6351-0538-2740822B87B0}"/>
+              </a:ext>
+            </a:extLst>
+          </p:cNvPr>
+          <p:cNvCxnSpPr>
+            <a:cxnSpLocks/>
+          </p:cNvCxnSpPr>
+          <p:nvPr/>
+        </p:nvCxnSpPr>
+        <p:spPr>
+          <a:xfrm flipV="1">
+            <a:off x="8241184" y="866947"/>
+            <a:ext cx="0" cy="4670862"/>
+          </a:xfrm>
+          <a:prstGeom prst="line">
+            <a:avLst/>
+          </a:prstGeom>
+          <a:ln>
+            <a:solidFill>
+              <a:schemeClr val="tx1"/>
+            </a:solidFill>
+          </a:ln>
+        </p:spPr>
+        <p:style>
+          <a:lnRef idx="1">
+            <a:schemeClr val="accent1"/>
+          </a:lnRef>
+          <a:fillRef idx="0">
+            <a:schemeClr val="accent1"/>
+          </a:fillRef>
+          <a:effectRef idx="0">
+            <a:schemeClr val="accent1"/>
+          </a:effectRef>
+          <a:fontRef idx="minor">
+            <a:schemeClr val="tx1"/>
+          </a:fontRef>
+        </p:style>
+      </p:cxnSp>
+      <p:cxnSp>
+        <p:nvCxnSpPr>
+          <p:cNvPr id="63" name="Straight Connector 62">
+            <a:extLst>
+              <a:ext uri="{FF2B5EF4-FFF2-40B4-BE49-F238E27FC236}">
+                <a16:creationId xmlns:a16="http://schemas.microsoft.com/office/drawing/2014/main" id="{68E5E56A-B64F-D9D9-9A0A-D11CC038A307}"/>
+              </a:ext>
+            </a:extLst>
+          </p:cNvPr>
+          <p:cNvCxnSpPr>
+            <a:cxnSpLocks/>
+          </p:cNvCxnSpPr>
+          <p:nvPr/>
+        </p:nvCxnSpPr>
+        <p:spPr>
+          <a:xfrm flipV="1">
+            <a:off x="9158117" y="866947"/>
+            <a:ext cx="0" cy="4670862"/>
+          </a:xfrm>
+          <a:prstGeom prst="line">
+            <a:avLst/>
+          </a:prstGeom>
+          <a:ln>
+            <a:solidFill>
+              <a:schemeClr val="tx1"/>
+            </a:solidFill>
+          </a:ln>
+        </p:spPr>
+        <p:style>
+          <a:lnRef idx="1">
+            <a:schemeClr val="accent1"/>
+          </a:lnRef>
+          <a:fillRef idx="0">
+            <a:schemeClr val="accent1"/>
+          </a:fillRef>
+          <a:effectRef idx="0">
+            <a:schemeClr val="accent1"/>
+          </a:effectRef>
+          <a:fontRef idx="minor">
+            <a:schemeClr val="tx1"/>
+          </a:fontRef>
+        </p:style>
+      </p:cxnSp>
+      <p:cxnSp>
+        <p:nvCxnSpPr>
+          <p:cNvPr id="64" name="Straight Connector 63">
+            <a:extLst>
+              <a:ext uri="{FF2B5EF4-FFF2-40B4-BE49-F238E27FC236}">
+                <a16:creationId xmlns:a16="http://schemas.microsoft.com/office/drawing/2014/main" id="{549BF76C-18A2-E5A3-AF44-45D87C52AD18}"/>
+              </a:ext>
+            </a:extLst>
+          </p:cNvPr>
+          <p:cNvCxnSpPr>
+            <a:cxnSpLocks/>
+          </p:cNvCxnSpPr>
+          <p:nvPr/>
+        </p:nvCxnSpPr>
+        <p:spPr>
+          <a:xfrm flipV="1">
+            <a:off x="8709022" y="866947"/>
+            <a:ext cx="0" cy="4670862"/>
+          </a:xfrm>
+          <a:prstGeom prst="line">
+            <a:avLst/>
+          </a:prstGeom>
+          <a:ln>
+            <a:solidFill>
+              <a:schemeClr val="tx1"/>
+            </a:solidFill>
+          </a:ln>
+        </p:spPr>
+        <p:style>
+          <a:lnRef idx="1">
+            <a:schemeClr val="accent1"/>
+          </a:lnRef>
+          <a:fillRef idx="0">
+            <a:schemeClr val="accent1"/>
+          </a:fillRef>
+          <a:effectRef idx="0">
+            <a:schemeClr val="accent1"/>
+          </a:effectRef>
+          <a:fontRef idx="minor">
+            <a:schemeClr val="tx1"/>
+          </a:fontRef>
+        </p:style>
+      </p:cxnSp>
+      <p:sp>
+        <p:nvSpPr>
+          <p:cNvPr id="65" name="Rectangle 64">
+            <a:extLst>
+              <a:ext uri="{FF2B5EF4-FFF2-40B4-BE49-F238E27FC236}">
+                <a16:creationId xmlns:a16="http://schemas.microsoft.com/office/drawing/2014/main" id="{FC3F459F-FF60-FC39-ADFF-03DA3AA2ACED}"/>
+              </a:ext>
+            </a:extLst>
+          </p:cNvPr>
+          <p:cNvSpPr/>
+          <p:nvPr/>
+        </p:nvSpPr>
+        <p:spPr>
+          <a:xfrm>
+            <a:off x="8986503" y="2589182"/>
+            <a:ext cx="176943" cy="208573"/>
+          </a:xfrm>
+          <a:prstGeom prst="rect">
+            <a:avLst/>
+          </a:prstGeom>
+          <a:solidFill>
+            <a:srgbClr val="00B050"/>
+          </a:solidFill>
+          <a:ln>
+            <a:noFill/>
+          </a:ln>
+        </p:spPr>
+        <p:style>
+          <a:lnRef idx="2">
+            <a:schemeClr val="accent1">
+              <a:shade val="50000"/>
+            </a:schemeClr>
+          </a:lnRef>
+          <a:fillRef idx="1">
+            <a:schemeClr val="accent1"/>
+          </a:fillRef>
+          <a:effectRef idx="0">
+            <a:schemeClr val="accent1"/>
+          </a:effectRef>
+          <a:fontRef idx="minor">
+            <a:schemeClr val="lt1"/>
+          </a:fontRef>
+        </p:style>
+        <p:txBody>
+          <a:bodyPr rtlCol="0" anchor="ctr"/>
+          <a:lstStyle/>
+          <a:p>
+            <a:pPr algn="ctr"/>
+            <a:endParaRPr lang="en-US"/>
+          </a:p>
+        </p:txBody>
+      </p:sp>
+      <p:sp>
+        <p:nvSpPr>
+          <p:cNvPr id="66" name="Rectangle 65">
+            <a:extLst>
+              <a:ext uri="{FF2B5EF4-FFF2-40B4-BE49-F238E27FC236}">
+                <a16:creationId xmlns:a16="http://schemas.microsoft.com/office/drawing/2014/main" id="{556AC10B-A368-F888-8628-7FCAEF5CFE38}"/>
+              </a:ext>
+            </a:extLst>
+          </p:cNvPr>
+          <p:cNvSpPr/>
+          <p:nvPr/>
+        </p:nvSpPr>
+        <p:spPr>
+          <a:xfrm>
+            <a:off x="9164091" y="3336424"/>
+            <a:ext cx="176943" cy="208573"/>
+          </a:xfrm>
+          <a:prstGeom prst="rect">
+            <a:avLst/>
+          </a:prstGeom>
+          <a:solidFill>
+            <a:schemeClr val="accent2"/>
+          </a:solidFill>
+          <a:ln>
+            <a:noFill/>
+          </a:ln>
+        </p:spPr>
+        <p:style>
+          <a:lnRef idx="2">
+            <a:schemeClr val="accent1">
+              <a:shade val="50000"/>
+            </a:schemeClr>
+          </a:lnRef>
+          <a:fillRef idx="1">
+            <a:schemeClr val="accent1"/>
+          </a:fillRef>
+          <a:effectRef idx="0">
+            <a:schemeClr val="accent1"/>
+          </a:effectRef>
+          <a:fontRef idx="minor">
+            <a:schemeClr val="lt1"/>
+          </a:fontRef>
+        </p:style>
+        <p:txBody>
+          <a:bodyPr rtlCol="0" anchor="ctr"/>
+          <a:lstStyle/>
+          <a:p>
+            <a:pPr algn="ctr"/>
+            <a:endParaRPr lang="en-US"/>
+          </a:p>
+        </p:txBody>
+      </p:sp>
+      <p:sp>
+        <p:nvSpPr>
+          <p:cNvPr id="67" name="Rectangle 66">
+            <a:extLst>
+              <a:ext uri="{FF2B5EF4-FFF2-40B4-BE49-F238E27FC236}">
+                <a16:creationId xmlns:a16="http://schemas.microsoft.com/office/drawing/2014/main" id="{513B617C-38CB-19F9-146E-65AA0AEB619A}"/>
+              </a:ext>
+            </a:extLst>
+          </p:cNvPr>
+          <p:cNvSpPr/>
+          <p:nvPr/>
+        </p:nvSpPr>
+        <p:spPr>
+          <a:xfrm>
+            <a:off x="9340883" y="4089768"/>
+            <a:ext cx="176943" cy="208573"/>
+          </a:xfrm>
+          <a:prstGeom prst="rect">
+            <a:avLst/>
+          </a:prstGeom>
+          <a:solidFill>
+            <a:schemeClr val="accent1"/>
+          </a:solidFill>
+          <a:ln>
+            <a:noFill/>
+          </a:ln>
+        </p:spPr>
+        <p:style>
+          <a:lnRef idx="2">
+            <a:schemeClr val="accent1">
+              <a:shade val="50000"/>
+            </a:schemeClr>
+          </a:lnRef>
+          <a:fillRef idx="1">
+            <a:schemeClr val="accent1"/>
+          </a:fillRef>
+          <a:effectRef idx="0">
+            <a:schemeClr val="accent1"/>
+          </a:effectRef>
+          <a:fontRef idx="minor">
+            <a:schemeClr val="lt1"/>
+          </a:fontRef>
+        </p:style>
+        <p:txBody>
+          <a:bodyPr rtlCol="0" anchor="ctr"/>
+          <a:lstStyle/>
+          <a:p>
+            <a:pPr algn="ctr"/>
+            <a:endParaRPr lang="en-US"/>
+          </a:p>
+        </p:txBody>
+      </p:sp>
+      <p:cxnSp>
+        <p:nvCxnSpPr>
+          <p:cNvPr id="68" name="Straight Connector 67">
+            <a:extLst>
+              <a:ext uri="{FF2B5EF4-FFF2-40B4-BE49-F238E27FC236}">
+                <a16:creationId xmlns:a16="http://schemas.microsoft.com/office/drawing/2014/main" id="{61162DC1-37B7-2C77-B39A-29EA3B31C4B1}"/>
+              </a:ext>
+            </a:extLst>
+          </p:cNvPr>
+          <p:cNvCxnSpPr>
+            <a:cxnSpLocks/>
+          </p:cNvCxnSpPr>
+          <p:nvPr/>
+        </p:nvCxnSpPr>
+        <p:spPr>
+          <a:xfrm flipV="1">
+            <a:off x="8977538" y="866947"/>
+            <a:ext cx="0" cy="4670862"/>
+          </a:xfrm>
+          <a:prstGeom prst="line">
+            <a:avLst/>
+          </a:prstGeom>
+          <a:ln>
+            <a:solidFill>
+              <a:schemeClr val="tx1"/>
+            </a:solidFill>
+          </a:ln>
+        </p:spPr>
+        <p:style>
+          <a:lnRef idx="1">
+            <a:schemeClr val="accent1"/>
+          </a:lnRef>
+          <a:fillRef idx="0">
+            <a:schemeClr val="accent1"/>
+          </a:fillRef>
+          <a:effectRef idx="0">
+            <a:schemeClr val="accent1"/>
+          </a:effectRef>
+          <a:fontRef idx="minor">
+            <a:schemeClr val="tx1"/>
+          </a:fontRef>
+        </p:style>
+      </p:cxnSp>
+      <p:cxnSp>
+        <p:nvCxnSpPr>
+          <p:cNvPr id="69" name="Straight Connector 68">
+            <a:extLst>
+              <a:ext uri="{FF2B5EF4-FFF2-40B4-BE49-F238E27FC236}">
+                <a16:creationId xmlns:a16="http://schemas.microsoft.com/office/drawing/2014/main" id="{5054E5B9-C91E-A070-1E1C-FF50E802CF5F}"/>
+              </a:ext>
+            </a:extLst>
+          </p:cNvPr>
+          <p:cNvCxnSpPr>
+            <a:cxnSpLocks/>
+          </p:cNvCxnSpPr>
+          <p:nvPr/>
+        </p:nvCxnSpPr>
+        <p:spPr>
+          <a:xfrm flipV="1">
+            <a:off x="9508861" y="866947"/>
+            <a:ext cx="0" cy="4670862"/>
+          </a:xfrm>
+          <a:prstGeom prst="line">
+            <a:avLst/>
+          </a:prstGeom>
+          <a:ln>
+            <a:solidFill>
+              <a:schemeClr val="tx1"/>
+            </a:solidFill>
+          </a:ln>
+        </p:spPr>
+        <p:style>
+          <a:lnRef idx="1">
+            <a:schemeClr val="accent1"/>
+          </a:lnRef>
+          <a:fillRef idx="0">
+            <a:schemeClr val="accent1"/>
+          </a:fillRef>
+          <a:effectRef idx="0">
+            <a:schemeClr val="accent1"/>
+          </a:effectRef>
+          <a:fontRef idx="minor">
+            <a:schemeClr val="tx1"/>
+          </a:fontRef>
+        </p:style>
+      </p:cxnSp>
+      <p:sp>
+        <p:nvSpPr>
+          <p:cNvPr id="70" name="Rectangle 69">
+            <a:extLst>
+              <a:ext uri="{FF2B5EF4-FFF2-40B4-BE49-F238E27FC236}">
+                <a16:creationId xmlns:a16="http://schemas.microsoft.com/office/drawing/2014/main" id="{88336773-7BE4-F583-720F-B05A64452303}"/>
+              </a:ext>
+            </a:extLst>
+          </p:cNvPr>
+          <p:cNvSpPr/>
+          <p:nvPr/>
+        </p:nvSpPr>
+        <p:spPr>
+          <a:xfrm>
+            <a:off x="9979808" y="1119171"/>
+            <a:ext cx="467838" cy="208585"/>
+          </a:xfrm>
+          <a:prstGeom prst="rect">
+            <a:avLst/>
+          </a:prstGeom>
+          <a:solidFill>
+            <a:schemeClr val="accent4">
+              <a:lumMod val="75000"/>
+            </a:schemeClr>
+          </a:solidFill>
+          <a:ln>
+            <a:noFill/>
+          </a:ln>
+        </p:spPr>
+        <p:style>
+          <a:lnRef idx="2">
+            <a:schemeClr val="accent1">
+              <a:shade val="50000"/>
+            </a:schemeClr>
+          </a:lnRef>
+          <a:fillRef idx="1">
+            <a:schemeClr val="accent1"/>
+          </a:fillRef>
+          <a:effectRef idx="0">
+            <a:schemeClr val="accent1"/>
+          </a:effectRef>
+          <a:fontRef idx="minor">
+            <a:schemeClr val="lt1"/>
+          </a:fontRef>
+        </p:style>
+        <p:txBody>
+          <a:bodyPr rtlCol="0" anchor="ctr"/>
+          <a:lstStyle/>
+          <a:p>
+            <a:pPr algn="ctr"/>
+            <a:endParaRPr lang="en-US"/>
+          </a:p>
+        </p:txBody>
+      </p:sp>
+      <p:sp>
+        <p:nvSpPr>
+          <p:cNvPr id="71" name="Rectangle 70">
+            <a:extLst>
+              <a:ext uri="{FF2B5EF4-FFF2-40B4-BE49-F238E27FC236}">
+                <a16:creationId xmlns:a16="http://schemas.microsoft.com/office/drawing/2014/main" id="{95784E29-2FF5-5D80-19F9-58EC94DDE147}"/>
+              </a:ext>
+            </a:extLst>
+          </p:cNvPr>
+          <p:cNvSpPr/>
+          <p:nvPr/>
+        </p:nvSpPr>
+        <p:spPr>
+          <a:xfrm>
+            <a:off x="9506396" y="1844456"/>
+            <a:ext cx="467838" cy="208585"/>
+          </a:xfrm>
+          <a:prstGeom prst="rect">
+            <a:avLst/>
+          </a:prstGeom>
+          <a:solidFill>
+            <a:schemeClr val="accent6">
+              <a:lumMod val="60000"/>
+              <a:lumOff val="40000"/>
+            </a:schemeClr>
+          </a:solidFill>
+          <a:ln>
+            <a:noFill/>
+          </a:ln>
+        </p:spPr>
+        <p:style>
+          <a:lnRef idx="2">
+            <a:schemeClr val="accent1">
+              <a:shade val="50000"/>
+            </a:schemeClr>
+          </a:lnRef>
+          <a:fillRef idx="1">
+            <a:schemeClr val="accent1"/>
+          </a:fillRef>
+          <a:effectRef idx="0">
+            <a:schemeClr val="accent1"/>
+          </a:effectRef>
+          <a:fontRef idx="minor">
+            <a:schemeClr val="lt1"/>
+          </a:fontRef>
+        </p:style>
+        <p:txBody>
+          <a:bodyPr rtlCol="0" anchor="ctr"/>
+          <a:lstStyle/>
+          <a:p>
+            <a:pPr algn="ctr"/>
+            <a:endParaRPr lang="en-US"/>
+          </a:p>
+        </p:txBody>
+      </p:sp>
+      <p:sp>
+        <p:nvSpPr>
+          <p:cNvPr id="72" name="Rectangle 71">
+            <a:extLst>
+              <a:ext uri="{FF2B5EF4-FFF2-40B4-BE49-F238E27FC236}">
+                <a16:creationId xmlns:a16="http://schemas.microsoft.com/office/drawing/2014/main" id="{2CE41F30-506F-DB2F-D8D5-3FE2099F3CF1}"/>
+              </a:ext>
+            </a:extLst>
+          </p:cNvPr>
+          <p:cNvSpPr/>
+          <p:nvPr/>
+        </p:nvSpPr>
+        <p:spPr>
+          <a:xfrm>
+            <a:off x="10912116" y="1119171"/>
+            <a:ext cx="467838" cy="208585"/>
+          </a:xfrm>
+          <a:prstGeom prst="rect">
+            <a:avLst/>
+          </a:prstGeom>
+          <a:solidFill>
+            <a:schemeClr val="accent4">
+              <a:lumMod val="75000"/>
+            </a:schemeClr>
+          </a:solidFill>
+          <a:ln>
+            <a:noFill/>
+          </a:ln>
+        </p:spPr>
+        <p:style>
+          <a:lnRef idx="2">
+            <a:schemeClr val="accent1">
+              <a:shade val="50000"/>
+            </a:schemeClr>
+          </a:lnRef>
+          <a:fillRef idx="1">
+            <a:schemeClr val="accent1"/>
+          </a:fillRef>
+          <a:effectRef idx="0">
+            <a:schemeClr val="accent1"/>
+          </a:effectRef>
+          <a:fontRef idx="minor">
+            <a:schemeClr val="lt1"/>
+          </a:fontRef>
+        </p:style>
+        <p:txBody>
+          <a:bodyPr rtlCol="0" anchor="ctr"/>
+          <a:lstStyle/>
+          <a:p>
+            <a:pPr algn="ctr"/>
+            <a:endParaRPr lang="en-US"/>
+          </a:p>
+        </p:txBody>
+      </p:sp>
+      <p:sp>
+        <p:nvSpPr>
+          <p:cNvPr id="73" name="Rectangle 72">
+            <a:extLst>
+              <a:ext uri="{FF2B5EF4-FFF2-40B4-BE49-F238E27FC236}">
+                <a16:creationId xmlns:a16="http://schemas.microsoft.com/office/drawing/2014/main" id="{395D0809-6BB7-C0C3-9344-E1BC1EF7262A}"/>
+              </a:ext>
+            </a:extLst>
+          </p:cNvPr>
+          <p:cNvSpPr/>
+          <p:nvPr/>
+        </p:nvSpPr>
+        <p:spPr>
+          <a:xfrm>
+            <a:off x="10446163" y="1844456"/>
+            <a:ext cx="467838" cy="208585"/>
+          </a:xfrm>
+          <a:prstGeom prst="rect">
+            <a:avLst/>
+          </a:prstGeom>
+          <a:solidFill>
+            <a:schemeClr val="accent6">
+              <a:lumMod val="60000"/>
+              <a:lumOff val="40000"/>
+            </a:schemeClr>
+          </a:solidFill>
+          <a:ln>
+            <a:noFill/>
+          </a:ln>
+        </p:spPr>
+        <p:style>
+          <a:lnRef idx="2">
+            <a:schemeClr val="accent1">
+              <a:shade val="50000"/>
+            </a:schemeClr>
+          </a:lnRef>
+          <a:fillRef idx="1">
+            <a:schemeClr val="accent1"/>
+          </a:fillRef>
+          <a:effectRef idx="0">
+            <a:schemeClr val="accent1"/>
+          </a:effectRef>
+          <a:fontRef idx="minor">
+            <a:schemeClr val="lt1"/>
+          </a:fontRef>
+        </p:style>
+        <p:txBody>
+          <a:bodyPr rtlCol="0" anchor="ctr"/>
+          <a:lstStyle/>
+          <a:p>
+            <a:pPr algn="ctr"/>
+            <a:endParaRPr lang="en-US"/>
+          </a:p>
+        </p:txBody>
+      </p:sp>
+      <p:sp>
+        <p:nvSpPr>
+          <p:cNvPr id="77" name="Rectangle 76">
+            <a:extLst>
+              <a:ext uri="{FF2B5EF4-FFF2-40B4-BE49-F238E27FC236}">
+                <a16:creationId xmlns:a16="http://schemas.microsoft.com/office/drawing/2014/main" id="{B9B06E71-9270-30C9-D461-C5EB71FA35AE}"/>
+              </a:ext>
+            </a:extLst>
+          </p:cNvPr>
+          <p:cNvSpPr/>
+          <p:nvPr/>
+        </p:nvSpPr>
+        <p:spPr>
+          <a:xfrm>
+            <a:off x="11371898" y="2589182"/>
+            <a:ext cx="176943" cy="208573"/>
+          </a:xfrm>
+          <a:prstGeom prst="rect">
+            <a:avLst/>
+          </a:prstGeom>
+          <a:solidFill>
+            <a:srgbClr val="00B050"/>
+          </a:solidFill>
+          <a:ln>
+            <a:noFill/>
+          </a:ln>
+        </p:spPr>
+        <p:style>
+          <a:lnRef idx="2">
+            <a:schemeClr val="accent1">
+              <a:shade val="50000"/>
+            </a:schemeClr>
+          </a:lnRef>
+          <a:fillRef idx="1">
+            <a:schemeClr val="accent1"/>
+          </a:fillRef>
+          <a:effectRef idx="0">
+            <a:schemeClr val="accent1"/>
+          </a:effectRef>
+          <a:fontRef idx="minor">
+            <a:schemeClr val="lt1"/>
+          </a:fontRef>
+        </p:style>
+        <p:txBody>
+          <a:bodyPr rtlCol="0" anchor="ctr"/>
+          <a:lstStyle/>
+          <a:p>
+            <a:pPr algn="ctr"/>
+            <a:endParaRPr lang="en-US"/>
+          </a:p>
+        </p:txBody>
+      </p:sp>
+      <p:sp>
+        <p:nvSpPr>
+          <p:cNvPr id="78" name="Rectangle 77">
+            <a:extLst>
+              <a:ext uri="{FF2B5EF4-FFF2-40B4-BE49-F238E27FC236}">
+                <a16:creationId xmlns:a16="http://schemas.microsoft.com/office/drawing/2014/main" id="{37C93165-027C-015F-DC85-B3CDAA91D1BF}"/>
+              </a:ext>
+            </a:extLst>
+          </p:cNvPr>
+          <p:cNvSpPr/>
+          <p:nvPr/>
+        </p:nvSpPr>
+        <p:spPr>
+          <a:xfrm>
+            <a:off x="11549486" y="3336424"/>
+            <a:ext cx="176943" cy="208573"/>
+          </a:xfrm>
+          <a:prstGeom prst="rect">
+            <a:avLst/>
+          </a:prstGeom>
+          <a:solidFill>
+            <a:schemeClr val="accent2"/>
+          </a:solidFill>
+          <a:ln>
+            <a:noFill/>
+          </a:ln>
+        </p:spPr>
+        <p:style>
+          <a:lnRef idx="2">
+            <a:schemeClr val="accent1">
+              <a:shade val="50000"/>
+            </a:schemeClr>
+          </a:lnRef>
+          <a:fillRef idx="1">
+            <a:schemeClr val="accent1"/>
+          </a:fillRef>
+          <a:effectRef idx="0">
+            <a:schemeClr val="accent1"/>
+          </a:effectRef>
+          <a:fontRef idx="minor">
+            <a:schemeClr val="lt1"/>
+          </a:fontRef>
+        </p:style>
+        <p:txBody>
+          <a:bodyPr rtlCol="0" anchor="ctr"/>
+          <a:lstStyle/>
+          <a:p>
+            <a:pPr algn="ctr"/>
+            <a:endParaRPr lang="en-US"/>
+          </a:p>
+        </p:txBody>
+      </p:sp>
+      <p:sp>
+        <p:nvSpPr>
+          <p:cNvPr id="79" name="Rectangle 78">
+            <a:extLst>
+              <a:ext uri="{FF2B5EF4-FFF2-40B4-BE49-F238E27FC236}">
+                <a16:creationId xmlns:a16="http://schemas.microsoft.com/office/drawing/2014/main" id="{2D07B78A-4C97-F1DB-4C09-6AC8F35B438C}"/>
+              </a:ext>
+            </a:extLst>
+          </p:cNvPr>
+          <p:cNvSpPr/>
+          <p:nvPr/>
+        </p:nvSpPr>
+        <p:spPr>
+          <a:xfrm>
+            <a:off x="11726278" y="4089768"/>
+            <a:ext cx="176943" cy="208573"/>
+          </a:xfrm>
+          <a:prstGeom prst="rect">
+            <a:avLst/>
+          </a:prstGeom>
+          <a:solidFill>
+            <a:schemeClr val="accent1"/>
+          </a:solidFill>
+          <a:ln>
+            <a:noFill/>
+          </a:ln>
+        </p:spPr>
+        <p:style>
+          <a:lnRef idx="2">
+            <a:schemeClr val="accent1">
+              <a:shade val="50000"/>
+            </a:schemeClr>
+          </a:lnRef>
+          <a:fillRef idx="1">
+            <a:schemeClr val="accent1"/>
+          </a:fillRef>
+          <a:effectRef idx="0">
+            <a:schemeClr val="accent1"/>
+          </a:effectRef>
+          <a:fontRef idx="minor">
+            <a:schemeClr val="lt1"/>
+          </a:fontRef>
+        </p:style>
+        <p:txBody>
+          <a:bodyPr rtlCol="0" anchor="ctr"/>
+          <a:lstStyle/>
+          <a:p>
+            <a:pPr algn="ctr"/>
+            <a:endParaRPr lang="en-US"/>
+          </a:p>
+        </p:txBody>
+      </p:sp>
+      <p:cxnSp>
+        <p:nvCxnSpPr>
+          <p:cNvPr id="81" name="Straight Connector 80">
+            <a:extLst>
+              <a:ext uri="{FF2B5EF4-FFF2-40B4-BE49-F238E27FC236}">
+                <a16:creationId xmlns:a16="http://schemas.microsoft.com/office/drawing/2014/main" id="{567B282D-9BDC-A2A9-FA89-D25CF391A5EC}"/>
+              </a:ext>
+            </a:extLst>
+          </p:cNvPr>
+          <p:cNvCxnSpPr>
+            <a:cxnSpLocks/>
+          </p:cNvCxnSpPr>
+          <p:nvPr/>
+        </p:nvCxnSpPr>
+        <p:spPr>
+          <a:xfrm flipV="1">
+            <a:off x="10434992" y="866947"/>
+            <a:ext cx="0" cy="4670862"/>
+          </a:xfrm>
+          <a:prstGeom prst="line">
+            <a:avLst/>
+          </a:prstGeom>
+          <a:ln>
+            <a:solidFill>
+              <a:schemeClr val="tx1"/>
+            </a:solidFill>
+          </a:ln>
+        </p:spPr>
+        <p:style>
+          <a:lnRef idx="1">
+            <a:schemeClr val="accent1"/>
+          </a:lnRef>
+          <a:fillRef idx="0">
+            <a:schemeClr val="accent1"/>
+          </a:fillRef>
+          <a:effectRef idx="0">
+            <a:schemeClr val="accent1"/>
+          </a:effectRef>
+          <a:fontRef idx="minor">
+            <a:schemeClr val="tx1"/>
+          </a:fontRef>
+        </p:style>
+      </p:cxnSp>
+      <p:cxnSp>
+        <p:nvCxnSpPr>
+          <p:cNvPr id="82" name="Straight Connector 81">
+            <a:extLst>
+              <a:ext uri="{FF2B5EF4-FFF2-40B4-BE49-F238E27FC236}">
+                <a16:creationId xmlns:a16="http://schemas.microsoft.com/office/drawing/2014/main" id="{C27E438A-4C81-A0D0-FCAB-7A88FE0C2579}"/>
+              </a:ext>
+            </a:extLst>
+          </p:cNvPr>
+          <p:cNvCxnSpPr>
+            <a:cxnSpLocks/>
+          </p:cNvCxnSpPr>
+          <p:nvPr/>
+        </p:nvCxnSpPr>
+        <p:spPr>
+          <a:xfrm flipV="1">
+            <a:off x="10905939" y="866947"/>
+            <a:ext cx="0" cy="4670862"/>
+          </a:xfrm>
+          <a:prstGeom prst="line">
+            <a:avLst/>
+          </a:prstGeom>
+          <a:ln>
+            <a:solidFill>
+              <a:schemeClr val="tx1"/>
+            </a:solidFill>
+          </a:ln>
+        </p:spPr>
+        <p:style>
+          <a:lnRef idx="1">
+            <a:schemeClr val="accent1"/>
+          </a:lnRef>
+          <a:fillRef idx="0">
+            <a:schemeClr val="accent1"/>
+          </a:fillRef>
+          <a:effectRef idx="0">
+            <a:schemeClr val="accent1"/>
+          </a:effectRef>
+          <a:fontRef idx="minor">
+            <a:schemeClr val="tx1"/>
+          </a:fontRef>
+        </p:style>
+      </p:cxnSp>
+      <p:cxnSp>
+        <p:nvCxnSpPr>
+          <p:cNvPr id="83" name="Straight Connector 82">
+            <a:extLst>
+              <a:ext uri="{FF2B5EF4-FFF2-40B4-BE49-F238E27FC236}">
+                <a16:creationId xmlns:a16="http://schemas.microsoft.com/office/drawing/2014/main" id="{7ABADEF8-4948-F803-DB49-02E7E2AAA640}"/>
+              </a:ext>
+            </a:extLst>
+          </p:cNvPr>
+          <p:cNvCxnSpPr>
+            <a:cxnSpLocks/>
+          </p:cNvCxnSpPr>
+          <p:nvPr/>
+        </p:nvCxnSpPr>
+        <p:spPr>
+          <a:xfrm flipV="1">
+            <a:off x="11548841" y="866947"/>
+            <a:ext cx="0" cy="4670862"/>
+          </a:xfrm>
+          <a:prstGeom prst="line">
+            <a:avLst/>
+          </a:prstGeom>
+          <a:ln>
+            <a:solidFill>
+              <a:schemeClr val="tx1"/>
+            </a:solidFill>
+          </a:ln>
+        </p:spPr>
+        <p:style>
+          <a:lnRef idx="1">
+            <a:schemeClr val="accent1"/>
+          </a:lnRef>
+          <a:fillRef idx="0">
+            <a:schemeClr val="accent1"/>
+          </a:fillRef>
+          <a:effectRef idx="0">
+            <a:schemeClr val="accent1"/>
+          </a:effectRef>
+          <a:fontRef idx="minor">
+            <a:schemeClr val="tx1"/>
+          </a:fontRef>
+        </p:style>
+      </p:cxnSp>
+      <p:cxnSp>
+        <p:nvCxnSpPr>
+          <p:cNvPr id="84" name="Straight Connector 83">
+            <a:extLst>
+              <a:ext uri="{FF2B5EF4-FFF2-40B4-BE49-F238E27FC236}">
+                <a16:creationId xmlns:a16="http://schemas.microsoft.com/office/drawing/2014/main" id="{C9F83B24-B63E-D0A4-1A4A-12391FF82B63}"/>
+              </a:ext>
+            </a:extLst>
+          </p:cNvPr>
+          <p:cNvCxnSpPr>
+            <a:cxnSpLocks/>
+          </p:cNvCxnSpPr>
+          <p:nvPr/>
+        </p:nvCxnSpPr>
+        <p:spPr>
+          <a:xfrm flipV="1">
+            <a:off x="11726278" y="866947"/>
+            <a:ext cx="0" cy="4670862"/>
+          </a:xfrm>
+          <a:prstGeom prst="line">
+            <a:avLst/>
+          </a:prstGeom>
+          <a:ln>
+            <a:solidFill>
+              <a:schemeClr val="tx1"/>
+            </a:solidFill>
+          </a:ln>
+        </p:spPr>
+        <p:style>
+          <a:lnRef idx="1">
+            <a:schemeClr val="accent1"/>
+          </a:lnRef>
+          <a:fillRef idx="0">
+            <a:schemeClr val="accent1"/>
+          </a:fillRef>
+          <a:effectRef idx="0">
+            <a:schemeClr val="accent1"/>
+          </a:effectRef>
+          <a:fontRef idx="minor">
+            <a:schemeClr val="tx1"/>
+          </a:fontRef>
+        </p:style>
+      </p:cxnSp>
+      <p:cxnSp>
+        <p:nvCxnSpPr>
+          <p:cNvPr id="85" name="Straight Connector 84">
+            <a:extLst>
+              <a:ext uri="{FF2B5EF4-FFF2-40B4-BE49-F238E27FC236}">
+                <a16:creationId xmlns:a16="http://schemas.microsoft.com/office/drawing/2014/main" id="{5C8A0725-9CAD-4339-8404-65231AA96B64}"/>
+              </a:ext>
+            </a:extLst>
+          </p:cNvPr>
+          <p:cNvCxnSpPr>
+            <a:cxnSpLocks/>
+          </p:cNvCxnSpPr>
+          <p:nvPr/>
+        </p:nvCxnSpPr>
+        <p:spPr>
+          <a:xfrm flipV="1">
+            <a:off x="11903221" y="866947"/>
+            <a:ext cx="0" cy="4670862"/>
+          </a:xfrm>
+          <a:prstGeom prst="line">
+            <a:avLst/>
+          </a:prstGeom>
+          <a:ln>
+            <a:solidFill>
+              <a:schemeClr val="tx1"/>
+            </a:solidFill>
+          </a:ln>
+        </p:spPr>
+        <p:style>
+          <a:lnRef idx="1">
+            <a:schemeClr val="accent1"/>
+          </a:lnRef>
+          <a:fillRef idx="0">
+            <a:schemeClr val="accent1"/>
+          </a:fillRef>
+          <a:effectRef idx="0">
+            <a:schemeClr val="accent1"/>
+          </a:effectRef>
+          <a:fontRef idx="minor">
+            <a:schemeClr val="tx1"/>
+          </a:fontRef>
+        </p:style>
+      </p:cxnSp>
+      <p:sp>
+        <p:nvSpPr>
+          <p:cNvPr id="88" name="TextBox 87">
+            <a:extLst>
+              <a:ext uri="{FF2B5EF4-FFF2-40B4-BE49-F238E27FC236}">
+                <a16:creationId xmlns:a16="http://schemas.microsoft.com/office/drawing/2014/main" id="{844F997B-880A-2302-43F3-FC30BEEB6388}"/>
+              </a:ext>
+            </a:extLst>
+          </p:cNvPr>
+          <p:cNvSpPr txBox="1"/>
+          <p:nvPr/>
+        </p:nvSpPr>
+        <p:spPr>
+          <a:xfrm>
+            <a:off x="8036860" y="5537809"/>
+            <a:ext cx="424048" cy="523220"/>
+          </a:xfrm>
+          <a:prstGeom prst="rect">
+            <a:avLst/>
+          </a:prstGeom>
+          <a:noFill/>
+        </p:spPr>
+        <p:txBody>
+          <a:bodyPr wrap="square" rtlCol="0">
+            <a:spAutoFit/>
+          </a:bodyPr>
+          <a:lstStyle/>
+          <a:p>
+            <a:pPr algn="ctr"/>
+            <a:r>
+              <a:rPr lang="en-US" sz="1400" dirty="0">
+                <a:latin typeface="Times New Roman" panose="02020603050405020304" pitchFamily="18" charset="0"/>
+                <a:cs typeface="Times New Roman" panose="02020603050405020304" pitchFamily="18" charset="0"/>
+              </a:rPr>
+              <a:t>T</a:t>
+            </a:r>
+          </a:p>
+          <a:p>
+            <a:pPr algn="ctr"/>
+            <a:r>
+              <a:rPr lang="en-US" sz="1400" dirty="0">
+                <a:latin typeface="Times New Roman" panose="02020603050405020304" pitchFamily="18" charset="0"/>
+                <a:cs typeface="Times New Roman" panose="02020603050405020304" pitchFamily="18" charset="0"/>
+              </a:rPr>
+              <a:t>10</a:t>
+            </a:r>
+          </a:p>
+        </p:txBody>
+      </p:sp>
+      <p:sp>
+        <p:nvSpPr>
+          <p:cNvPr id="119" name="TextBox 118">
+            <a:extLst>
+              <a:ext uri="{FF2B5EF4-FFF2-40B4-BE49-F238E27FC236}">
+                <a16:creationId xmlns:a16="http://schemas.microsoft.com/office/drawing/2014/main" id="{5FCA105B-C78C-F96F-C6E3-0C84DA8725A8}"/>
+              </a:ext>
+            </a:extLst>
+          </p:cNvPr>
+          <p:cNvSpPr txBox="1"/>
+          <p:nvPr/>
+        </p:nvSpPr>
+        <p:spPr>
+          <a:xfrm>
+            <a:off x="8527114" y="5537809"/>
+            <a:ext cx="357535" cy="523220"/>
+          </a:xfrm>
+          <a:prstGeom prst="rect">
+            <a:avLst/>
+          </a:prstGeom>
+          <a:noFill/>
+        </p:spPr>
+        <p:txBody>
+          <a:bodyPr wrap="none" rtlCol="0">
+            <a:spAutoFit/>
+          </a:bodyPr>
+          <a:lstStyle/>
+          <a:p>
+            <a:pPr algn="ctr"/>
+            <a:r>
+              <a:rPr lang="en-US" sz="1400" dirty="0">
+                <a:latin typeface="Times New Roman" panose="02020603050405020304" pitchFamily="18" charset="0"/>
+                <a:cs typeface="Times New Roman" panose="02020603050405020304" pitchFamily="18" charset="0"/>
+              </a:rPr>
+              <a:t>T</a:t>
+            </a:r>
+          </a:p>
+          <a:p>
+            <a:pPr algn="ctr"/>
+            <a:r>
+              <a:rPr lang="en-US" sz="1400" dirty="0">
+                <a:latin typeface="Times New Roman" panose="02020603050405020304" pitchFamily="18" charset="0"/>
+                <a:cs typeface="Times New Roman" panose="02020603050405020304" pitchFamily="18" charset="0"/>
+              </a:rPr>
+              <a:t>11</a:t>
+            </a:r>
+          </a:p>
+        </p:txBody>
+      </p:sp>
+      <p:sp>
+        <p:nvSpPr>
+          <p:cNvPr id="120" name="TextBox 119">
+            <a:extLst>
+              <a:ext uri="{FF2B5EF4-FFF2-40B4-BE49-F238E27FC236}">
+                <a16:creationId xmlns:a16="http://schemas.microsoft.com/office/drawing/2014/main" id="{6A284A34-37F4-A7E0-E2A8-3FD427E8A8C7}"/>
+              </a:ext>
+            </a:extLst>
+          </p:cNvPr>
+          <p:cNvSpPr txBox="1"/>
+          <p:nvPr/>
+        </p:nvSpPr>
+        <p:spPr>
+          <a:xfrm>
+            <a:off x="8750105" y="5537809"/>
+            <a:ext cx="424048" cy="523220"/>
+          </a:xfrm>
+          <a:prstGeom prst="rect">
+            <a:avLst/>
+          </a:prstGeom>
+          <a:noFill/>
+        </p:spPr>
+        <p:txBody>
+          <a:bodyPr wrap="square" rtlCol="0">
+            <a:spAutoFit/>
+          </a:bodyPr>
+          <a:lstStyle/>
+          <a:p>
+            <a:pPr algn="ctr"/>
+            <a:r>
+              <a:rPr lang="en-US" sz="1400" dirty="0">
+                <a:latin typeface="Times New Roman" panose="02020603050405020304" pitchFamily="18" charset="0"/>
+                <a:cs typeface="Times New Roman" panose="02020603050405020304" pitchFamily="18" charset="0"/>
+              </a:rPr>
+              <a:t>T</a:t>
+            </a:r>
+          </a:p>
+          <a:p>
+            <a:pPr algn="ctr"/>
+            <a:r>
+              <a:rPr lang="en-US" sz="1400" dirty="0">
+                <a:latin typeface="Times New Roman" panose="02020603050405020304" pitchFamily="18" charset="0"/>
+                <a:cs typeface="Times New Roman" panose="02020603050405020304" pitchFamily="18" charset="0"/>
+              </a:rPr>
+              <a:t>12</a:t>
+            </a:r>
+          </a:p>
+        </p:txBody>
+      </p:sp>
+      <p:sp>
+        <p:nvSpPr>
+          <p:cNvPr id="121" name="TextBox 120">
+            <a:extLst>
+              <a:ext uri="{FF2B5EF4-FFF2-40B4-BE49-F238E27FC236}">
+                <a16:creationId xmlns:a16="http://schemas.microsoft.com/office/drawing/2014/main" id="{C90C041F-987B-A81E-C733-81BFB02F27F3}"/>
+              </a:ext>
+            </a:extLst>
+          </p:cNvPr>
+          <p:cNvSpPr txBox="1"/>
+          <p:nvPr/>
+        </p:nvSpPr>
+        <p:spPr>
+          <a:xfrm>
+            <a:off x="8940890" y="5537809"/>
+            <a:ext cx="424048" cy="523220"/>
+          </a:xfrm>
+          <a:prstGeom prst="rect">
+            <a:avLst/>
+          </a:prstGeom>
+          <a:noFill/>
+        </p:spPr>
+        <p:txBody>
+          <a:bodyPr wrap="square" rtlCol="0">
+            <a:spAutoFit/>
+          </a:bodyPr>
+          <a:lstStyle/>
+          <a:p>
+            <a:pPr algn="ctr"/>
+            <a:r>
+              <a:rPr lang="en-US" sz="1400" dirty="0">
+                <a:latin typeface="Times New Roman" panose="02020603050405020304" pitchFamily="18" charset="0"/>
+                <a:cs typeface="Times New Roman" panose="02020603050405020304" pitchFamily="18" charset="0"/>
+              </a:rPr>
+              <a:t>T</a:t>
+            </a:r>
+          </a:p>
+          <a:p>
+            <a:pPr algn="ctr"/>
+            <a:r>
+              <a:rPr lang="en-US" sz="1400" dirty="0">
+                <a:latin typeface="Times New Roman" panose="02020603050405020304" pitchFamily="18" charset="0"/>
+                <a:cs typeface="Times New Roman" panose="02020603050405020304" pitchFamily="18" charset="0"/>
+              </a:rPr>
+              <a:t>13</a:t>
+            </a:r>
+          </a:p>
+        </p:txBody>
+      </p:sp>
+      <p:sp>
+        <p:nvSpPr>
+          <p:cNvPr id="122" name="TextBox 121">
+            <a:extLst>
+              <a:ext uri="{FF2B5EF4-FFF2-40B4-BE49-F238E27FC236}">
+                <a16:creationId xmlns:a16="http://schemas.microsoft.com/office/drawing/2014/main" id="{C771BC8C-FF81-EADC-B3E4-DF4865D6A970}"/>
+              </a:ext>
+            </a:extLst>
+          </p:cNvPr>
+          <p:cNvSpPr txBox="1"/>
+          <p:nvPr/>
+        </p:nvSpPr>
+        <p:spPr>
+          <a:xfrm>
+            <a:off x="9121852" y="5537809"/>
+            <a:ext cx="424048" cy="523220"/>
+          </a:xfrm>
+          <a:prstGeom prst="rect">
+            <a:avLst/>
+          </a:prstGeom>
+          <a:noFill/>
+        </p:spPr>
+        <p:txBody>
+          <a:bodyPr wrap="square" rtlCol="0">
+            <a:spAutoFit/>
+          </a:bodyPr>
+          <a:lstStyle/>
+          <a:p>
+            <a:pPr algn="ctr"/>
+            <a:r>
+              <a:rPr lang="en-US" sz="1400" dirty="0">
+                <a:latin typeface="Times New Roman" panose="02020603050405020304" pitchFamily="18" charset="0"/>
+                <a:cs typeface="Times New Roman" panose="02020603050405020304" pitchFamily="18" charset="0"/>
+              </a:rPr>
+              <a:t>T</a:t>
+            </a:r>
+          </a:p>
+          <a:p>
+            <a:pPr algn="ctr"/>
+            <a:r>
+              <a:rPr lang="en-US" sz="1400" dirty="0">
+                <a:latin typeface="Times New Roman" panose="02020603050405020304" pitchFamily="18" charset="0"/>
+                <a:cs typeface="Times New Roman" panose="02020603050405020304" pitchFamily="18" charset="0"/>
+              </a:rPr>
+              <a:t>14</a:t>
+            </a:r>
+          </a:p>
+        </p:txBody>
+      </p:sp>
+      <p:sp>
+        <p:nvSpPr>
+          <p:cNvPr id="123" name="TextBox 122">
+            <a:extLst>
+              <a:ext uri="{FF2B5EF4-FFF2-40B4-BE49-F238E27FC236}">
+                <a16:creationId xmlns:a16="http://schemas.microsoft.com/office/drawing/2014/main" id="{06862831-E0C6-DE7D-D4C2-DAE56083987C}"/>
+              </a:ext>
+            </a:extLst>
+          </p:cNvPr>
+          <p:cNvSpPr txBox="1"/>
+          <p:nvPr/>
+        </p:nvSpPr>
+        <p:spPr>
+          <a:xfrm>
+            <a:off x="9290282" y="5537809"/>
+            <a:ext cx="424048" cy="523220"/>
+          </a:xfrm>
+          <a:prstGeom prst="rect">
+            <a:avLst/>
+          </a:prstGeom>
+          <a:noFill/>
+        </p:spPr>
+        <p:txBody>
+          <a:bodyPr wrap="square" rtlCol="0">
+            <a:spAutoFit/>
+          </a:bodyPr>
+          <a:lstStyle/>
+          <a:p>
+            <a:pPr algn="ctr"/>
+            <a:r>
+              <a:rPr lang="en-US" sz="1400" dirty="0">
+                <a:latin typeface="Times New Roman" panose="02020603050405020304" pitchFamily="18" charset="0"/>
+                <a:cs typeface="Times New Roman" panose="02020603050405020304" pitchFamily="18" charset="0"/>
+              </a:rPr>
+              <a:t>T</a:t>
+            </a:r>
+          </a:p>
+          <a:p>
+            <a:pPr algn="ctr"/>
+            <a:r>
+              <a:rPr lang="en-US" sz="1400" dirty="0">
+                <a:latin typeface="Times New Roman" panose="02020603050405020304" pitchFamily="18" charset="0"/>
+                <a:cs typeface="Times New Roman" panose="02020603050405020304" pitchFamily="18" charset="0"/>
+              </a:rPr>
+              <a:t>15</a:t>
+            </a:r>
+          </a:p>
+        </p:txBody>
+      </p:sp>
+      <p:sp>
+        <p:nvSpPr>
+          <p:cNvPr id="124" name="TextBox 123">
+            <a:extLst>
+              <a:ext uri="{FF2B5EF4-FFF2-40B4-BE49-F238E27FC236}">
+                <a16:creationId xmlns:a16="http://schemas.microsoft.com/office/drawing/2014/main" id="{E34DFA4F-828B-9400-09CC-1AD8122C0BC7}"/>
+              </a:ext>
+            </a:extLst>
+          </p:cNvPr>
+          <p:cNvSpPr txBox="1"/>
+          <p:nvPr/>
+        </p:nvSpPr>
+        <p:spPr>
+          <a:xfrm>
+            <a:off x="9749719" y="5537809"/>
+            <a:ext cx="424048" cy="523220"/>
+          </a:xfrm>
+          <a:prstGeom prst="rect">
+            <a:avLst/>
+          </a:prstGeom>
+          <a:noFill/>
+        </p:spPr>
+        <p:txBody>
+          <a:bodyPr wrap="square" rtlCol="0">
+            <a:spAutoFit/>
+          </a:bodyPr>
+          <a:lstStyle/>
+          <a:p>
+            <a:pPr algn="ctr"/>
+            <a:r>
+              <a:rPr lang="en-US" sz="1400" dirty="0">
+                <a:latin typeface="Times New Roman" panose="02020603050405020304" pitchFamily="18" charset="0"/>
+                <a:cs typeface="Times New Roman" panose="02020603050405020304" pitchFamily="18" charset="0"/>
+              </a:rPr>
+              <a:t>T</a:t>
+            </a:r>
+          </a:p>
+          <a:p>
+            <a:pPr algn="ctr"/>
+            <a:r>
+              <a:rPr lang="en-US" sz="1400" dirty="0">
+                <a:latin typeface="Times New Roman" panose="02020603050405020304" pitchFamily="18" charset="0"/>
+                <a:cs typeface="Times New Roman" panose="02020603050405020304" pitchFamily="18" charset="0"/>
+              </a:rPr>
+              <a:t>16</a:t>
+            </a:r>
+          </a:p>
+        </p:txBody>
+      </p:sp>
+      <p:sp>
+        <p:nvSpPr>
+          <p:cNvPr id="125" name="TextBox 124">
+            <a:extLst>
+              <a:ext uri="{FF2B5EF4-FFF2-40B4-BE49-F238E27FC236}">
+                <a16:creationId xmlns:a16="http://schemas.microsoft.com/office/drawing/2014/main" id="{2D5561CC-33CA-AB76-3C6F-A0224CD25C01}"/>
+              </a:ext>
+            </a:extLst>
+          </p:cNvPr>
+          <p:cNvSpPr txBox="1"/>
+          <p:nvPr/>
+        </p:nvSpPr>
+        <p:spPr>
+          <a:xfrm>
+            <a:off x="10216311" y="5537809"/>
+            <a:ext cx="424048" cy="523220"/>
+          </a:xfrm>
+          <a:prstGeom prst="rect">
+            <a:avLst/>
+          </a:prstGeom>
+          <a:noFill/>
+        </p:spPr>
+        <p:txBody>
+          <a:bodyPr wrap="square" rtlCol="0">
+            <a:spAutoFit/>
+          </a:bodyPr>
+          <a:lstStyle/>
+          <a:p>
+            <a:pPr algn="ctr"/>
+            <a:r>
+              <a:rPr lang="en-US" sz="1400" dirty="0">
+                <a:latin typeface="Times New Roman" panose="02020603050405020304" pitchFamily="18" charset="0"/>
+                <a:cs typeface="Times New Roman" panose="02020603050405020304" pitchFamily="18" charset="0"/>
+              </a:rPr>
+              <a:t>T</a:t>
+            </a:r>
+          </a:p>
+          <a:p>
+            <a:pPr algn="ctr"/>
+            <a:r>
+              <a:rPr lang="en-US" sz="1400" dirty="0">
+                <a:latin typeface="Times New Roman" panose="02020603050405020304" pitchFamily="18" charset="0"/>
+                <a:cs typeface="Times New Roman" panose="02020603050405020304" pitchFamily="18" charset="0"/>
+              </a:rPr>
+              <a:t>17</a:t>
+            </a:r>
+          </a:p>
+        </p:txBody>
+      </p:sp>
+      <p:sp>
+        <p:nvSpPr>
+          <p:cNvPr id="126" name="TextBox 125">
+            <a:extLst>
+              <a:ext uri="{FF2B5EF4-FFF2-40B4-BE49-F238E27FC236}">
+                <a16:creationId xmlns:a16="http://schemas.microsoft.com/office/drawing/2014/main" id="{78886F76-7F5C-5926-F53E-71723ABDFA0E}"/>
+              </a:ext>
+            </a:extLst>
+          </p:cNvPr>
+          <p:cNvSpPr txBox="1"/>
+          <p:nvPr/>
+        </p:nvSpPr>
+        <p:spPr>
+          <a:xfrm>
+            <a:off x="10689560" y="5537809"/>
+            <a:ext cx="424048" cy="523220"/>
+          </a:xfrm>
+          <a:prstGeom prst="rect">
+            <a:avLst/>
+          </a:prstGeom>
+          <a:noFill/>
+        </p:spPr>
+        <p:txBody>
+          <a:bodyPr wrap="square" rtlCol="0">
+            <a:spAutoFit/>
+          </a:bodyPr>
+          <a:lstStyle/>
+          <a:p>
+            <a:pPr algn="ctr"/>
+            <a:r>
+              <a:rPr lang="en-US" sz="1400" dirty="0">
+                <a:latin typeface="Times New Roman" panose="02020603050405020304" pitchFamily="18" charset="0"/>
+                <a:cs typeface="Times New Roman" panose="02020603050405020304" pitchFamily="18" charset="0"/>
+              </a:rPr>
+              <a:t>T</a:t>
+            </a:r>
+          </a:p>
+          <a:p>
+            <a:pPr algn="ctr"/>
+            <a:r>
+              <a:rPr lang="en-US" sz="1400" dirty="0">
+                <a:latin typeface="Times New Roman" panose="02020603050405020304" pitchFamily="18" charset="0"/>
+                <a:cs typeface="Times New Roman" panose="02020603050405020304" pitchFamily="18" charset="0"/>
+              </a:rPr>
+              <a:t>18</a:t>
+            </a:r>
+          </a:p>
+        </p:txBody>
+      </p:sp>
+      <p:sp>
+        <p:nvSpPr>
+          <p:cNvPr id="127" name="TextBox 126">
+            <a:extLst>
+              <a:ext uri="{FF2B5EF4-FFF2-40B4-BE49-F238E27FC236}">
+                <a16:creationId xmlns:a16="http://schemas.microsoft.com/office/drawing/2014/main" id="{6F6425A9-F377-F3A2-08DA-AAC0F7EB1987}"/>
+              </a:ext>
+            </a:extLst>
+          </p:cNvPr>
+          <p:cNvSpPr txBox="1"/>
+          <p:nvPr/>
+        </p:nvSpPr>
+        <p:spPr>
+          <a:xfrm>
+            <a:off x="11153527" y="5537809"/>
+            <a:ext cx="424048" cy="523220"/>
+          </a:xfrm>
+          <a:prstGeom prst="rect">
+            <a:avLst/>
+          </a:prstGeom>
+          <a:noFill/>
+        </p:spPr>
+        <p:txBody>
+          <a:bodyPr wrap="square" rtlCol="0">
+            <a:spAutoFit/>
+          </a:bodyPr>
+          <a:lstStyle/>
+          <a:p>
+            <a:pPr algn="ctr"/>
+            <a:r>
+              <a:rPr lang="en-US" sz="1400" dirty="0">
+                <a:latin typeface="Times New Roman" panose="02020603050405020304" pitchFamily="18" charset="0"/>
+                <a:cs typeface="Times New Roman" panose="02020603050405020304" pitchFamily="18" charset="0"/>
+              </a:rPr>
+              <a:t>T</a:t>
+            </a:r>
+          </a:p>
+          <a:p>
+            <a:pPr algn="ctr"/>
+            <a:r>
+              <a:rPr lang="en-US" sz="1400" dirty="0">
+                <a:latin typeface="Times New Roman" panose="02020603050405020304" pitchFamily="18" charset="0"/>
+                <a:cs typeface="Times New Roman" panose="02020603050405020304" pitchFamily="18" charset="0"/>
+              </a:rPr>
+              <a:t>19</a:t>
+            </a:r>
+          </a:p>
+        </p:txBody>
+      </p:sp>
+      <p:sp>
+        <p:nvSpPr>
+          <p:cNvPr id="128" name="TextBox 127">
+            <a:extLst>
+              <a:ext uri="{FF2B5EF4-FFF2-40B4-BE49-F238E27FC236}">
+                <a16:creationId xmlns:a16="http://schemas.microsoft.com/office/drawing/2014/main" id="{AFF7C78A-FB0B-DDE5-169E-9C78D310DC22}"/>
+              </a:ext>
+            </a:extLst>
+          </p:cNvPr>
+          <p:cNvSpPr txBox="1"/>
+          <p:nvPr/>
+        </p:nvSpPr>
+        <p:spPr>
+          <a:xfrm>
+            <a:off x="11340426" y="5537809"/>
+            <a:ext cx="424048" cy="523220"/>
+          </a:xfrm>
+          <a:prstGeom prst="rect">
+            <a:avLst/>
+          </a:prstGeom>
+          <a:noFill/>
+        </p:spPr>
+        <p:txBody>
+          <a:bodyPr wrap="square" rtlCol="0">
+            <a:spAutoFit/>
+          </a:bodyPr>
+          <a:lstStyle/>
+          <a:p>
+            <a:pPr algn="ctr"/>
+            <a:r>
+              <a:rPr lang="en-US" sz="1400" dirty="0">
+                <a:latin typeface="Times New Roman" panose="02020603050405020304" pitchFamily="18" charset="0"/>
+                <a:cs typeface="Times New Roman" panose="02020603050405020304" pitchFamily="18" charset="0"/>
+              </a:rPr>
+              <a:t>T</a:t>
+            </a:r>
+          </a:p>
+          <a:p>
+            <a:pPr algn="ctr"/>
+            <a:r>
+              <a:rPr lang="en-US" sz="1400" dirty="0">
+                <a:latin typeface="Times New Roman" panose="02020603050405020304" pitchFamily="18" charset="0"/>
+                <a:cs typeface="Times New Roman" panose="02020603050405020304" pitchFamily="18" charset="0"/>
+              </a:rPr>
+              <a:t>20</a:t>
+            </a:r>
+          </a:p>
+        </p:txBody>
+      </p:sp>
+      <p:sp>
+        <p:nvSpPr>
+          <p:cNvPr id="129" name="TextBox 128">
+            <a:extLst>
+              <a:ext uri="{FF2B5EF4-FFF2-40B4-BE49-F238E27FC236}">
+                <a16:creationId xmlns:a16="http://schemas.microsoft.com/office/drawing/2014/main" id="{B323416C-6107-C631-0C4C-EFA8B690D98D}"/>
+              </a:ext>
+            </a:extLst>
+          </p:cNvPr>
+          <p:cNvSpPr txBox="1"/>
+          <p:nvPr/>
+        </p:nvSpPr>
+        <p:spPr>
+          <a:xfrm>
+            <a:off x="11542480" y="5537809"/>
+            <a:ext cx="364203" cy="523220"/>
+          </a:xfrm>
+          <a:prstGeom prst="rect">
+            <a:avLst/>
+          </a:prstGeom>
+          <a:noFill/>
+        </p:spPr>
+        <p:txBody>
+          <a:bodyPr wrap="none" rtlCol="0">
+            <a:spAutoFit/>
+          </a:bodyPr>
+          <a:lstStyle/>
+          <a:p>
+            <a:pPr algn="ctr"/>
+            <a:r>
+              <a:rPr lang="en-US" sz="1400" dirty="0">
+                <a:latin typeface="Times New Roman" panose="02020603050405020304" pitchFamily="18" charset="0"/>
+                <a:cs typeface="Times New Roman" panose="02020603050405020304" pitchFamily="18" charset="0"/>
+              </a:rPr>
+              <a:t>T</a:t>
+            </a:r>
+          </a:p>
+          <a:p>
+            <a:pPr algn="ctr"/>
+            <a:r>
+              <a:rPr lang="en-US" sz="1400" dirty="0">
+                <a:latin typeface="Times New Roman" panose="02020603050405020304" pitchFamily="18" charset="0"/>
+                <a:cs typeface="Times New Roman" panose="02020603050405020304" pitchFamily="18" charset="0"/>
+              </a:rPr>
+              <a:t>21</a:t>
+            </a:r>
+          </a:p>
+        </p:txBody>
+      </p:sp>
+      <p:sp>
+        <p:nvSpPr>
+          <p:cNvPr id="130" name="TextBox 129">
+            <a:extLst>
+              <a:ext uri="{FF2B5EF4-FFF2-40B4-BE49-F238E27FC236}">
+                <a16:creationId xmlns:a16="http://schemas.microsoft.com/office/drawing/2014/main" id="{E89018E1-3CD2-B511-E832-44BE96614FD3}"/>
+              </a:ext>
+            </a:extLst>
+          </p:cNvPr>
+          <p:cNvSpPr txBox="1"/>
+          <p:nvPr/>
+        </p:nvSpPr>
+        <p:spPr>
+          <a:xfrm>
+            <a:off x="11730872" y="5537809"/>
+            <a:ext cx="364203" cy="523220"/>
+          </a:xfrm>
+          <a:prstGeom prst="rect">
+            <a:avLst/>
+          </a:prstGeom>
+          <a:noFill/>
+        </p:spPr>
+        <p:txBody>
+          <a:bodyPr wrap="none" rtlCol="0">
+            <a:spAutoFit/>
+          </a:bodyPr>
+          <a:lstStyle/>
+          <a:p>
+            <a:pPr algn="ctr"/>
+            <a:r>
+              <a:rPr lang="en-US" sz="1400" dirty="0">
+                <a:latin typeface="Times New Roman" panose="02020603050405020304" pitchFamily="18" charset="0"/>
+                <a:cs typeface="Times New Roman" panose="02020603050405020304" pitchFamily="18" charset="0"/>
+              </a:rPr>
+              <a:t>T</a:t>
+            </a:r>
+          </a:p>
+          <a:p>
+            <a:pPr algn="ctr"/>
+            <a:r>
+              <a:rPr lang="en-US" sz="1400" dirty="0">
+                <a:latin typeface="Times New Roman" panose="02020603050405020304" pitchFamily="18" charset="0"/>
+                <a:cs typeface="Times New Roman" panose="02020603050405020304" pitchFamily="18" charset="0"/>
+              </a:rPr>
+              <a:t>22</a:t>
+            </a:r>
+          </a:p>
+        </p:txBody>
+      </p:sp>
+      <p:sp>
+        <p:nvSpPr>
+          <p:cNvPr id="3" name="Rectangle 2">
+            <a:extLst>
+              <a:ext uri="{FF2B5EF4-FFF2-40B4-BE49-F238E27FC236}">
+                <a16:creationId xmlns:a16="http://schemas.microsoft.com/office/drawing/2014/main" id="{6F2CE66F-4EE9-BFE3-DE81-EE8D50D7283C}"/>
+              </a:ext>
+            </a:extLst>
+          </p:cNvPr>
+          <p:cNvSpPr/>
+          <p:nvPr/>
+        </p:nvSpPr>
+        <p:spPr>
+          <a:xfrm>
+            <a:off x="11907242" y="1119172"/>
+            <a:ext cx="284758" cy="208567"/>
+          </a:xfrm>
+          <a:prstGeom prst="rect">
+            <a:avLst/>
+          </a:prstGeom>
+          <a:solidFill>
+            <a:schemeClr val="accent4">
+              <a:lumMod val="75000"/>
+            </a:schemeClr>
+          </a:solidFill>
+          <a:ln>
+            <a:noFill/>
+          </a:ln>
+        </p:spPr>
+        <p:style>
+          <a:lnRef idx="2">
+            <a:schemeClr val="accent1">
+              <a:shade val="50000"/>
+            </a:schemeClr>
+          </a:lnRef>
+          <a:fillRef idx="1">
+            <a:schemeClr val="accent1"/>
+          </a:fillRef>
+          <a:effectRef idx="0">
+            <a:schemeClr val="accent1"/>
+          </a:effectRef>
+          <a:fontRef idx="minor">
+            <a:schemeClr val="lt1"/>
+          </a:fontRef>
+        </p:style>
+        <p:txBody>
+          <a:bodyPr rtlCol="0" anchor="ctr"/>
+          <a:lstStyle/>
+          <a:p>
+            <a:pPr algn="ctr"/>
+            <a:endParaRPr lang="en-US"/>
+          </a:p>
+        </p:txBody>
+      </p:sp>
+    </p:spTree>
+    <p:extLst>
+      <p:ext uri="{BB962C8B-B14F-4D97-AF65-F5344CB8AC3E}">
+        <p14:creationId xmlns:p14="http://schemas.microsoft.com/office/powerpoint/2010/main" val="1290048110"/>
+      </p:ext>
+    </p:extLst>
+  </p:cSld>
+  <p:clrMapOvr>
+    <a:masterClrMapping/>
+  </p:clrMapOvr>
+</p:sld>
+</file>
+
+<file path=ppt/slides/slide7.xml><?xml version="1.0" encoding="utf-8"?>
+<p:sld xmlns:a="http://schemas.openxmlformats.org/drawingml/2006/main" xmlns:r="http://schemas.openxmlformats.org/officeDocument/2006/relationships" xmlns:p="http://schemas.openxmlformats.org/presentationml/2006/main">
+  <p:cSld>
+    <p:spTree>
+      <p:nvGrpSpPr>
+        <p:cNvPr id="1" name=""/>
+        <p:cNvGrpSpPr/>
+        <p:nvPr/>
+      </p:nvGrpSpPr>
+      <p:grpSpPr>
+        <a:xfrm>
+          <a:off x="0" y="0"/>
+          <a:ext cx="0" cy="0"/>
+          <a:chOff x="0" y="0"/>
+          <a:chExt cx="0" cy="0"/>
+        </a:xfrm>
+      </p:grpSpPr>
+      <p:sp>
+        <p:nvSpPr>
+          <p:cNvPr id="2" name="Title 1">
+            <a:extLst>
+              <a:ext uri="{FF2B5EF4-FFF2-40B4-BE49-F238E27FC236}">
                 <a16:creationId xmlns:a16="http://schemas.microsoft.com/office/drawing/2014/main" id="{2B3468C1-D42E-E395-5AFB-E286BFE3EA97}"/>
               </a:ext>
             </a:extLst>
@@ -4985,8 +8754,8 @@
         </p:blipFill>
         <p:spPr>
           <a:xfrm>
-            <a:off x="3517973" y="581948"/>
-            <a:ext cx="8553409" cy="5694103"/>
+            <a:off x="3625550" y="765876"/>
+            <a:ext cx="8000833" cy="5326247"/>
           </a:xfrm>
           <a:prstGeom prst="rect">
             <a:avLst/>
@@ -4996,7 +8765,7 @@
     </p:spTree>
     <p:extLst>
       <p:ext uri="{BB962C8B-B14F-4D97-AF65-F5344CB8AC3E}">
-        <p14:creationId xmlns:p14="http://schemas.microsoft.com/office/powerpoint/2010/main" val="3825993930"/>
+        <p14:creationId xmlns:p14="http://schemas.microsoft.com/office/powerpoint/2010/main" val="2789982821"/>
       </p:ext>
     </p:extLst>
   </p:cSld>
@@ -5006,7 +8775,7 @@
 </p:sld>
 </file>
 
-<file path=ppt/slides/slide7.xml><?xml version="1.0" encoding="utf-8"?>
+<file path=ppt/slides/slide8.xml><?xml version="1.0" encoding="utf-8"?>
 <p:sld xmlns:a="http://schemas.openxmlformats.org/drawingml/2006/main" xmlns:r="http://schemas.openxmlformats.org/officeDocument/2006/relationships" xmlns:p="http://schemas.openxmlformats.org/presentationml/2006/main">
   <p:cSld>
     <p:spTree>
@@ -7670,7 +11439,7 @@
 </p:sld>
 </file>
 
-<file path=ppt/slides/slide8.xml><?xml version="1.0" encoding="utf-8"?>
+<file path=ppt/slides/slide9.xml><?xml version="1.0" encoding="utf-8"?>
 <p:sld xmlns:a="http://schemas.openxmlformats.org/drawingml/2006/main" xmlns:r="http://schemas.openxmlformats.org/officeDocument/2006/relationships" xmlns:p="http://schemas.openxmlformats.org/presentationml/2006/main">
   <p:cSld>
     <p:spTree>

</xml_diff>

<commit_message>
Update flowchart & tambah potensiomeer pada gambar
</commit_message>
<xml_diff>
--- a/Tugas8_STL_Kelompok4.pptx
+++ b/Tugas8_STL_Kelompok4.pptx
@@ -207,7 +207,7 @@
           <a:p>
             <a:fld id="{2CF52475-A6BF-4B04-AF1A-B5BAF27906EC}" type="datetimeFigureOut">
               <a:rPr lang="en-ID" smtClean="0"/>
-              <a:t>24/05/2024</a:t>
+              <a:t>26/05/2024</a:t>
             </a:fld>
             <a:endParaRPr lang="en-ID"/>
           </a:p>
@@ -783,7 +783,7 @@
           <a:p>
             <a:fld id="{E682BB45-DAFE-4345-B4CA-BF7D165D75B8}" type="datetimeFigureOut">
               <a:rPr lang="en-ID" smtClean="0"/>
-              <a:t>24/05/2024</a:t>
+              <a:t>26/05/2024</a:t>
             </a:fld>
             <a:endParaRPr lang="en-ID"/>
           </a:p>
@@ -953,7 +953,7 @@
           <a:p>
             <a:fld id="{E682BB45-DAFE-4345-B4CA-BF7D165D75B8}" type="datetimeFigureOut">
               <a:rPr lang="en-ID" smtClean="0"/>
-              <a:t>24/05/2024</a:t>
+              <a:t>26/05/2024</a:t>
             </a:fld>
             <a:endParaRPr lang="en-ID"/>
           </a:p>
@@ -1133,7 +1133,7 @@
           <a:p>
             <a:fld id="{E682BB45-DAFE-4345-B4CA-BF7D165D75B8}" type="datetimeFigureOut">
               <a:rPr lang="en-ID" smtClean="0"/>
-              <a:t>24/05/2024</a:t>
+              <a:t>26/05/2024</a:t>
             </a:fld>
             <a:endParaRPr lang="en-ID"/>
           </a:p>
@@ -1303,7 +1303,7 @@
           <a:p>
             <a:fld id="{E682BB45-DAFE-4345-B4CA-BF7D165D75B8}" type="datetimeFigureOut">
               <a:rPr lang="en-ID" smtClean="0"/>
-              <a:t>24/05/2024</a:t>
+              <a:t>26/05/2024</a:t>
             </a:fld>
             <a:endParaRPr lang="en-ID"/>
           </a:p>
@@ -1561,7 +1561,7 @@
           <a:p>
             <a:fld id="{E682BB45-DAFE-4345-B4CA-BF7D165D75B8}" type="datetimeFigureOut">
               <a:rPr lang="en-ID" smtClean="0"/>
-              <a:t>24/05/2024</a:t>
+              <a:t>26/05/2024</a:t>
             </a:fld>
             <a:endParaRPr lang="en-ID"/>
           </a:p>
@@ -1849,7 +1849,7 @@
           <a:p>
             <a:fld id="{E682BB45-DAFE-4345-B4CA-BF7D165D75B8}" type="datetimeFigureOut">
               <a:rPr lang="en-ID" smtClean="0"/>
-              <a:t>24/05/2024</a:t>
+              <a:t>26/05/2024</a:t>
             </a:fld>
             <a:endParaRPr lang="en-ID"/>
           </a:p>
@@ -2291,7 +2291,7 @@
           <a:p>
             <a:fld id="{E682BB45-DAFE-4345-B4CA-BF7D165D75B8}" type="datetimeFigureOut">
               <a:rPr lang="en-ID" smtClean="0"/>
-              <a:t>24/05/2024</a:t>
+              <a:t>26/05/2024</a:t>
             </a:fld>
             <a:endParaRPr lang="en-ID"/>
           </a:p>
@@ -2409,7 +2409,7 @@
           <a:p>
             <a:fld id="{E682BB45-DAFE-4345-B4CA-BF7D165D75B8}" type="datetimeFigureOut">
               <a:rPr lang="en-ID" smtClean="0"/>
-              <a:t>24/05/2024</a:t>
+              <a:t>26/05/2024</a:t>
             </a:fld>
             <a:endParaRPr lang="en-ID"/>
           </a:p>
@@ -2504,7 +2504,7 @@
           <a:p>
             <a:fld id="{E682BB45-DAFE-4345-B4CA-BF7D165D75B8}" type="datetimeFigureOut">
               <a:rPr lang="en-ID" smtClean="0"/>
-              <a:t>24/05/2024</a:t>
+              <a:t>26/05/2024</a:t>
             </a:fld>
             <a:endParaRPr lang="en-ID"/>
           </a:p>
@@ -2792,7 +2792,7 @@
           <a:p>
             <a:fld id="{E682BB45-DAFE-4345-B4CA-BF7D165D75B8}" type="datetimeFigureOut">
               <a:rPr lang="en-ID" smtClean="0"/>
-              <a:t>24/05/2024</a:t>
+              <a:t>26/05/2024</a:t>
             </a:fld>
             <a:endParaRPr lang="en-ID"/>
           </a:p>
@@ -3065,7 +3065,7 @@
           <a:p>
             <a:fld id="{E682BB45-DAFE-4345-B4CA-BF7D165D75B8}" type="datetimeFigureOut">
               <a:rPr lang="en-ID" smtClean="0"/>
-              <a:t>24/05/2024</a:t>
+              <a:t>26/05/2024</a:t>
             </a:fld>
             <a:endParaRPr lang="en-ID"/>
           </a:p>
@@ -3362,7 +3362,7 @@
           <a:p>
             <a:fld id="{E682BB45-DAFE-4345-B4CA-BF7D165D75B8}" type="datetimeFigureOut">
               <a:rPr lang="en-ID" smtClean="0"/>
-              <a:t>24/05/2024</a:t>
+              <a:t>26/05/2024</a:t>
             </a:fld>
             <a:endParaRPr lang="en-ID"/>
           </a:p>
@@ -4471,7 +4471,7 @@
         <p:grpSpPr>
           <a:xfrm>
             <a:off x="8837164" y="909576"/>
-            <a:ext cx="2827020" cy="3347604"/>
+            <a:ext cx="2569976" cy="2554496"/>
             <a:chOff x="7440930" y="853624"/>
             <a:chExt cx="3100967" cy="4263357"/>
           </a:xfrm>
@@ -6644,6 +6644,72 @@
           </a:p>
         </p:txBody>
       </p:sp>
+      <p:pic>
+        <p:nvPicPr>
+          <p:cNvPr id="3" name="Picture 2">
+            <a:extLst>
+              <a:ext uri="{FF2B5EF4-FFF2-40B4-BE49-F238E27FC236}">
+                <a16:creationId xmlns:a16="http://schemas.microsoft.com/office/drawing/2014/main" id="{C5A9EB40-D708-25D7-9857-AD1A41E61FBB}"/>
+              </a:ext>
+            </a:extLst>
+          </p:cNvPr>
+          <p:cNvPicPr>
+            <a:picLocks noChangeAspect="1"/>
+          </p:cNvPicPr>
+          <p:nvPr/>
+        </p:nvPicPr>
+        <p:blipFill>
+          <a:blip r:embed="rId7"/>
+          <a:stretch>
+            <a:fillRect/>
+          </a:stretch>
+        </p:blipFill>
+        <p:spPr>
+          <a:xfrm>
+            <a:off x="8720993" y="3550170"/>
+            <a:ext cx="787440" cy="787440"/>
+          </a:xfrm>
+          <a:prstGeom prst="rect">
+            <a:avLst/>
+          </a:prstGeom>
+        </p:spPr>
+      </p:pic>
+      <p:sp>
+        <p:nvSpPr>
+          <p:cNvPr id="4" name="TextBox 3">
+            <a:extLst>
+              <a:ext uri="{FF2B5EF4-FFF2-40B4-BE49-F238E27FC236}">
+                <a16:creationId xmlns:a16="http://schemas.microsoft.com/office/drawing/2014/main" id="{9E49C211-46A7-B7FE-F41F-7632BA848DB8}"/>
+              </a:ext>
+            </a:extLst>
+          </p:cNvPr>
+          <p:cNvSpPr txBox="1"/>
+          <p:nvPr/>
+        </p:nvSpPr>
+        <p:spPr>
+          <a:xfrm>
+            <a:off x="10107584" y="3726147"/>
+            <a:ext cx="2042268" cy="369332"/>
+          </a:xfrm>
+          <a:prstGeom prst="rect">
+            <a:avLst/>
+          </a:prstGeom>
+          <a:noFill/>
+        </p:spPr>
+        <p:txBody>
+          <a:bodyPr wrap="square" rtlCol="0">
+            <a:spAutoFit/>
+          </a:bodyPr>
+          <a:lstStyle/>
+          <a:p>
+            <a:r>
+              <a:rPr lang="en-US" dirty="0"/>
+              <a:t>Potentiometer</a:t>
+            </a:r>
+            <a:endParaRPr lang="en-ID" dirty="0"/>
+          </a:p>
+        </p:txBody>
+      </p:sp>
     </p:spTree>
     <p:extLst>
       <p:ext uri="{BB962C8B-B14F-4D97-AF65-F5344CB8AC3E}">
@@ -6676,10 +6742,10 @@
       </p:grpSpPr>
       <p:pic>
         <p:nvPicPr>
-          <p:cNvPr id="4" name="Picture 3">
-            <a:extLst>
-              <a:ext uri="{FF2B5EF4-FFF2-40B4-BE49-F238E27FC236}">
-                <a16:creationId xmlns:a16="http://schemas.microsoft.com/office/drawing/2014/main" id="{04C8E4D9-9A8F-4863-E435-5D785B125BF1}"/>
+          <p:cNvPr id="3" name="Picture 2">
+            <a:extLst>
+              <a:ext uri="{FF2B5EF4-FFF2-40B4-BE49-F238E27FC236}">
+                <a16:creationId xmlns:a16="http://schemas.microsoft.com/office/drawing/2014/main" id="{1E0036FB-B85B-E5CE-8D4A-9104761EEFF4}"/>
               </a:ext>
             </a:extLst>
           </p:cNvPr>
@@ -6688,16 +6754,15 @@
           </p:cNvPicPr>
           <p:nvPr/>
         </p:nvPicPr>
-        <p:blipFill>
+        <p:blipFill rotWithShape="1">
           <a:blip r:embed="rId2"/>
-          <a:stretch>
-            <a:fillRect/>
-          </a:stretch>
+          <a:srcRect t="1505"/>
+          <a:stretch/>
         </p:blipFill>
         <p:spPr>
           <a:xfrm>
-            <a:off x="217170" y="115364"/>
-            <a:ext cx="5349240" cy="6502606"/>
+            <a:off x="201838" y="34290"/>
+            <a:ext cx="5806532" cy="6733189"/>
           </a:xfrm>
           <a:prstGeom prst="rect">
             <a:avLst/>
@@ -6706,10 +6771,10 @@
       </p:pic>
       <p:pic>
         <p:nvPicPr>
-          <p:cNvPr id="6" name="Picture 5">
-            <a:extLst>
-              <a:ext uri="{FF2B5EF4-FFF2-40B4-BE49-F238E27FC236}">
-                <a16:creationId xmlns:a16="http://schemas.microsoft.com/office/drawing/2014/main" id="{6F1D7CDC-0374-9B04-AC30-09F89AF34C80}"/>
+          <p:cNvPr id="7" name="Picture 6">
+            <a:extLst>
+              <a:ext uri="{FF2B5EF4-FFF2-40B4-BE49-F238E27FC236}">
+                <a16:creationId xmlns:a16="http://schemas.microsoft.com/office/drawing/2014/main" id="{FE413503-B04F-414C-0CFC-A697BE110557}"/>
               </a:ext>
             </a:extLst>
           </p:cNvPr>
@@ -6726,8 +6791,8 @@
         </p:blipFill>
         <p:spPr>
           <a:xfrm>
-            <a:off x="6008370" y="1885914"/>
-            <a:ext cx="3249930" cy="2046602"/>
+            <a:off x="7191314" y="432397"/>
+            <a:ext cx="3806970" cy="2345093"/>
           </a:xfrm>
           <a:prstGeom prst="rect">
             <a:avLst/>

</xml_diff>